<commit_message>
major cleanup and changes
</commit_message>
<xml_diff>
--- a/Big Data Project.pptx
+++ b/Big Data Project.pptx
@@ -4,16 +4,20 @@
   <p:sldMasterIdLst>
     <p:sldMasterId id="2147483648" r:id="rId1"/>
   </p:sldMasterIdLst>
+  <p:notesMasterIdLst>
+    <p:notesMasterId r:id="rId12"/>
+  </p:notesMasterIdLst>
   <p:sldIdLst>
     <p:sldId id="256" r:id="rId2"/>
     <p:sldId id="257" r:id="rId3"/>
     <p:sldId id="264" r:id="rId4"/>
-    <p:sldId id="261" r:id="rId5"/>
-    <p:sldId id="265" r:id="rId6"/>
-    <p:sldId id="262" r:id="rId7"/>
-    <p:sldId id="260" r:id="rId8"/>
-    <p:sldId id="258" r:id="rId9"/>
-    <p:sldId id="263" r:id="rId10"/>
+    <p:sldId id="266" r:id="rId5"/>
+    <p:sldId id="261" r:id="rId6"/>
+    <p:sldId id="267" r:id="rId7"/>
+    <p:sldId id="265" r:id="rId8"/>
+    <p:sldId id="262" r:id="rId9"/>
+    <p:sldId id="258" r:id="rId10"/>
+    <p:sldId id="263" r:id="rId11"/>
   </p:sldIdLst>
   <p:sldSz cx="12192000" cy="6858000"/>
   <p:notesSz cx="6858000" cy="9144000"/>
@@ -1700,6 +1704,13 @@
         </dgm:presLayoutVars>
       </dgm:prSet>
       <dgm:spPr/>
+      <dgm:t>
+        <a:bodyPr/>
+        <a:lstStyle/>
+        <a:p>
+          <a:endParaRPr lang="en-US"/>
+        </a:p>
+      </dgm:t>
     </dgm:pt>
     <dgm:pt modelId="{8952AFAF-761E-422A-883C-575FA4AA0F04}" type="pres">
       <dgm:prSet presAssocID="{DE81D696-55D7-4F04-A338-D15E16CC942E}" presName="spVertical2" presStyleCnt="0"/>
@@ -1742,7 +1753,7 @@
   <dgm:whole/>
   <dgm:extLst>
     <a:ext uri="http://schemas.microsoft.com/office/drawing/2008/diagram">
-      <dsp:dataModelExt xmlns:dsp="http://schemas.microsoft.com/office/drawing/2008/diagram" relId="rId6" minVer="http://schemas.openxmlformats.org/drawingml/2006/diagram"/>
+      <dsp:dataModelExt xmlns:dsp="http://schemas.microsoft.com/office/drawing/2008/diagram" relId="rId7" minVer="http://schemas.openxmlformats.org/drawingml/2006/diagram"/>
     </a:ext>
   </dgm:extLst>
 </dgm:dataModel>
@@ -1834,6 +1845,13 @@
         </dgm:presLayoutVars>
       </dgm:prSet>
       <dgm:spPr/>
+      <dgm:t>
+        <a:bodyPr/>
+        <a:lstStyle/>
+        <a:p>
+          <a:endParaRPr lang="en-US"/>
+        </a:p>
+      </dgm:t>
     </dgm:pt>
     <dgm:pt modelId="{8952AFAF-761E-422A-883C-575FA4AA0F04}" type="pres">
       <dgm:prSet presAssocID="{DE81D696-55D7-4F04-A338-D15E16CC942E}" presName="spVertical2" presStyleCnt="0"/>
@@ -1876,7 +1894,7 @@
   <dgm:whole/>
   <dgm:extLst>
     <a:ext uri="http://schemas.microsoft.com/office/drawing/2008/diagram">
-      <dsp:dataModelExt xmlns:dsp="http://schemas.microsoft.com/office/drawing/2008/diagram" relId="rId11" minVer="http://schemas.openxmlformats.org/drawingml/2006/diagram"/>
+      <dsp:dataModelExt xmlns:dsp="http://schemas.microsoft.com/office/drawing/2008/diagram" relId="rId12" minVer="http://schemas.openxmlformats.org/drawingml/2006/diagram"/>
     </a:ext>
   </dgm:extLst>
 </dgm:dataModel>
@@ -1977,7 +1995,7 @@
         </a:bodyPr>
         <a:lstStyle/>
         <a:p>
-          <a:pPr marL="0" lvl="0" indent="0" algn="ctr" defTabSz="1244600">
+          <a:pPr lvl="0" algn="ctr" defTabSz="1244600">
             <a:lnSpc>
               <a:spcPct val="90000"/>
             </a:lnSpc>
@@ -1987,7 +2005,6 @@
             <a:spcAft>
               <a:spcPct val="35000"/>
             </a:spcAft>
-            <a:buNone/>
           </a:pPr>
           <a:r>
             <a:rPr lang="en-US" sz="2800" kern="1200" dirty="0">
@@ -2103,7 +2120,7 @@
         </a:bodyPr>
         <a:lstStyle/>
         <a:p>
-          <a:pPr marL="0" lvl="0" indent="0" algn="ctr" defTabSz="1066800">
+          <a:pPr lvl="0" algn="ctr" defTabSz="1066800">
             <a:lnSpc>
               <a:spcPct val="90000"/>
             </a:lnSpc>
@@ -2113,7 +2130,6 @@
             <a:spcAft>
               <a:spcPct val="35000"/>
             </a:spcAft>
-            <a:buNone/>
           </a:pPr>
           <a:r>
             <a:rPr lang="en-US" sz="2400" kern="1200" dirty="0">
@@ -4832,6 +4848,623 @@
 </dgm:styleDef>
 </file>
 
+<file path=ppt/notesMasters/notesMaster1.xml><?xml version="1.0" encoding="utf-8"?>
+<p:notesMaster xmlns:a="http://schemas.openxmlformats.org/drawingml/2006/main" xmlns:r="http://schemas.openxmlformats.org/officeDocument/2006/relationships" xmlns:p="http://schemas.openxmlformats.org/presentationml/2006/main">
+  <p:cSld>
+    <p:bg>
+      <p:bgRef idx="1001">
+        <a:schemeClr val="bg1"/>
+      </p:bgRef>
+    </p:bg>
+    <p:spTree>
+      <p:nvGrpSpPr>
+        <p:cNvPr id="1" name=""/>
+        <p:cNvGrpSpPr/>
+        <p:nvPr/>
+      </p:nvGrpSpPr>
+      <p:grpSpPr>
+        <a:xfrm>
+          <a:off x="0" y="0"/>
+          <a:ext cx="0" cy="0"/>
+          <a:chOff x="0" y="0"/>
+          <a:chExt cx="0" cy="0"/>
+        </a:xfrm>
+      </p:grpSpPr>
+      <p:sp>
+        <p:nvSpPr>
+          <p:cNvPr id="2" name="Header Placeholder 1"/>
+          <p:cNvSpPr>
+            <a:spLocks noGrp="1"/>
+          </p:cNvSpPr>
+          <p:nvPr>
+            <p:ph type="hdr" sz="quarter"/>
+          </p:nvPr>
+        </p:nvSpPr>
+        <p:spPr>
+          <a:xfrm>
+            <a:off x="0" y="0"/>
+            <a:ext cx="2971800" cy="458788"/>
+          </a:xfrm>
+          <a:prstGeom prst="rect">
+            <a:avLst/>
+          </a:prstGeom>
+        </p:spPr>
+        <p:txBody>
+          <a:bodyPr vert="horz" lIns="91440" tIns="45720" rIns="91440" bIns="45720" rtlCol="0"/>
+          <a:lstStyle>
+            <a:lvl1pPr algn="l">
+              <a:defRPr sz="1200"/>
+            </a:lvl1pPr>
+          </a:lstStyle>
+          <a:p>
+            <a:endParaRPr lang="en-US"/>
+          </a:p>
+        </p:txBody>
+      </p:sp>
+      <p:sp>
+        <p:nvSpPr>
+          <p:cNvPr id="3" name="Date Placeholder 2"/>
+          <p:cNvSpPr>
+            <a:spLocks noGrp="1"/>
+          </p:cNvSpPr>
+          <p:nvPr>
+            <p:ph type="dt" idx="1"/>
+          </p:nvPr>
+        </p:nvSpPr>
+        <p:spPr>
+          <a:xfrm>
+            <a:off x="3884613" y="0"/>
+            <a:ext cx="2971800" cy="458788"/>
+          </a:xfrm>
+          <a:prstGeom prst="rect">
+            <a:avLst/>
+          </a:prstGeom>
+        </p:spPr>
+        <p:txBody>
+          <a:bodyPr vert="horz" lIns="91440" tIns="45720" rIns="91440" bIns="45720" rtlCol="0"/>
+          <a:lstStyle>
+            <a:lvl1pPr algn="r">
+              <a:defRPr sz="1200"/>
+            </a:lvl1pPr>
+          </a:lstStyle>
+          <a:p>
+            <a:fld id="{2F51C6A9-9B48-214A-BCCE-5B688AEA7A9F}" type="datetimeFigureOut">
+              <a:rPr lang="en-US" smtClean="0"/>
+              <a:t>11/30/16</a:t>
+            </a:fld>
+            <a:endParaRPr lang="en-US"/>
+          </a:p>
+        </p:txBody>
+      </p:sp>
+      <p:sp>
+        <p:nvSpPr>
+          <p:cNvPr id="4" name="Slide Image Placeholder 3"/>
+          <p:cNvSpPr>
+            <a:spLocks noGrp="1" noRot="1" noChangeAspect="1"/>
+          </p:cNvSpPr>
+          <p:nvPr>
+            <p:ph type="sldImg" idx="2"/>
+          </p:nvPr>
+        </p:nvSpPr>
+        <p:spPr>
+          <a:xfrm>
+            <a:off x="685800" y="1143000"/>
+            <a:ext cx="5486400" cy="3086100"/>
+          </a:xfrm>
+          <a:prstGeom prst="rect">
+            <a:avLst/>
+          </a:prstGeom>
+          <a:noFill/>
+          <a:ln w="12700">
+            <a:solidFill>
+              <a:prstClr val="black"/>
+            </a:solidFill>
+          </a:ln>
+        </p:spPr>
+        <p:txBody>
+          <a:bodyPr vert="horz" lIns="91440" tIns="45720" rIns="91440" bIns="45720" rtlCol="0" anchor="ctr"/>
+          <a:lstStyle/>
+          <a:p>
+            <a:endParaRPr lang="en-US"/>
+          </a:p>
+        </p:txBody>
+      </p:sp>
+      <p:sp>
+        <p:nvSpPr>
+          <p:cNvPr id="5" name="Notes Placeholder 4"/>
+          <p:cNvSpPr>
+            <a:spLocks noGrp="1"/>
+          </p:cNvSpPr>
+          <p:nvPr>
+            <p:ph type="body" sz="quarter" idx="3"/>
+          </p:nvPr>
+        </p:nvSpPr>
+        <p:spPr>
+          <a:xfrm>
+            <a:off x="685800" y="4400550"/>
+            <a:ext cx="5486400" cy="3600450"/>
+          </a:xfrm>
+          <a:prstGeom prst="rect">
+            <a:avLst/>
+          </a:prstGeom>
+        </p:spPr>
+        <p:txBody>
+          <a:bodyPr vert="horz" lIns="91440" tIns="45720" rIns="91440" bIns="45720" rtlCol="0"/>
+          <a:lstStyle/>
+          <a:p>
+            <a:pPr lvl="0"/>
+            <a:r>
+              <a:rPr lang="en-US" smtClean="0"/>
+              <a:t>Click to edit Master text styles</a:t>
+            </a:r>
+          </a:p>
+          <a:p>
+            <a:pPr lvl="1"/>
+            <a:r>
+              <a:rPr lang="en-US" smtClean="0"/>
+              <a:t>Second level</a:t>
+            </a:r>
+          </a:p>
+          <a:p>
+            <a:pPr lvl="2"/>
+            <a:r>
+              <a:rPr lang="en-US" smtClean="0"/>
+              <a:t>Third level</a:t>
+            </a:r>
+          </a:p>
+          <a:p>
+            <a:pPr lvl="3"/>
+            <a:r>
+              <a:rPr lang="en-US" smtClean="0"/>
+              <a:t>Fourth level</a:t>
+            </a:r>
+          </a:p>
+          <a:p>
+            <a:pPr lvl="4"/>
+            <a:r>
+              <a:rPr lang="en-US" smtClean="0"/>
+              <a:t>Fifth level</a:t>
+            </a:r>
+            <a:endParaRPr lang="en-US"/>
+          </a:p>
+        </p:txBody>
+      </p:sp>
+      <p:sp>
+        <p:nvSpPr>
+          <p:cNvPr id="6" name="Footer Placeholder 5"/>
+          <p:cNvSpPr>
+            <a:spLocks noGrp="1"/>
+          </p:cNvSpPr>
+          <p:nvPr>
+            <p:ph type="ftr" sz="quarter" idx="4"/>
+          </p:nvPr>
+        </p:nvSpPr>
+        <p:spPr>
+          <a:xfrm>
+            <a:off x="0" y="8685213"/>
+            <a:ext cx="2971800" cy="458787"/>
+          </a:xfrm>
+          <a:prstGeom prst="rect">
+            <a:avLst/>
+          </a:prstGeom>
+        </p:spPr>
+        <p:txBody>
+          <a:bodyPr vert="horz" lIns="91440" tIns="45720" rIns="91440" bIns="45720" rtlCol="0" anchor="b"/>
+          <a:lstStyle>
+            <a:lvl1pPr algn="l">
+              <a:defRPr sz="1200"/>
+            </a:lvl1pPr>
+          </a:lstStyle>
+          <a:p>
+            <a:endParaRPr lang="en-US"/>
+          </a:p>
+        </p:txBody>
+      </p:sp>
+      <p:sp>
+        <p:nvSpPr>
+          <p:cNvPr id="7" name="Slide Number Placeholder 6"/>
+          <p:cNvSpPr>
+            <a:spLocks noGrp="1"/>
+          </p:cNvSpPr>
+          <p:nvPr>
+            <p:ph type="sldNum" sz="quarter" idx="5"/>
+          </p:nvPr>
+        </p:nvSpPr>
+        <p:spPr>
+          <a:xfrm>
+            <a:off x="3884613" y="8685213"/>
+            <a:ext cx="2971800" cy="458787"/>
+          </a:xfrm>
+          <a:prstGeom prst="rect">
+            <a:avLst/>
+          </a:prstGeom>
+        </p:spPr>
+        <p:txBody>
+          <a:bodyPr vert="horz" lIns="91440" tIns="45720" rIns="91440" bIns="45720" rtlCol="0" anchor="b"/>
+          <a:lstStyle>
+            <a:lvl1pPr algn="r">
+              <a:defRPr sz="1200"/>
+            </a:lvl1pPr>
+          </a:lstStyle>
+          <a:p>
+            <a:fld id="{30297E2A-C7AB-874C-97FE-7F67254B703E}" type="slidenum">
+              <a:rPr lang="en-US" smtClean="0"/>
+              <a:t>‹#›</a:t>
+            </a:fld>
+            <a:endParaRPr lang="en-US"/>
+          </a:p>
+        </p:txBody>
+      </p:sp>
+    </p:spTree>
+    <p:extLst>
+      <p:ext uri="{BB962C8B-B14F-4D97-AF65-F5344CB8AC3E}">
+        <p14:creationId xmlns:p14="http://schemas.microsoft.com/office/powerpoint/2010/main" val="1233467681"/>
+      </p:ext>
+    </p:extLst>
+  </p:cSld>
+  <p:clrMap bg1="lt1" tx1="dk1" bg2="lt2" tx2="dk2" accent1="accent1" accent2="accent2" accent3="accent3" accent4="accent4" accent5="accent5" accent6="accent6" hlink="hlink" folHlink="folHlink"/>
+  <p:notesStyle>
+    <a:lvl1pPr marL="0" algn="l" defTabSz="914400" rtl="0" eaLnBrk="1" latinLnBrk="0" hangingPunct="1">
+      <a:defRPr sz="1200" kern="1200">
+        <a:solidFill>
+          <a:schemeClr val="tx1"/>
+        </a:solidFill>
+        <a:latin typeface="+mn-lt"/>
+        <a:ea typeface="+mn-ea"/>
+        <a:cs typeface="+mn-cs"/>
+      </a:defRPr>
+    </a:lvl1pPr>
+    <a:lvl2pPr marL="457200" algn="l" defTabSz="914400" rtl="0" eaLnBrk="1" latinLnBrk="0" hangingPunct="1">
+      <a:defRPr sz="1200" kern="1200">
+        <a:solidFill>
+          <a:schemeClr val="tx1"/>
+        </a:solidFill>
+        <a:latin typeface="+mn-lt"/>
+        <a:ea typeface="+mn-ea"/>
+        <a:cs typeface="+mn-cs"/>
+      </a:defRPr>
+    </a:lvl2pPr>
+    <a:lvl3pPr marL="914400" algn="l" defTabSz="914400" rtl="0" eaLnBrk="1" latinLnBrk="0" hangingPunct="1">
+      <a:defRPr sz="1200" kern="1200">
+        <a:solidFill>
+          <a:schemeClr val="tx1"/>
+        </a:solidFill>
+        <a:latin typeface="+mn-lt"/>
+        <a:ea typeface="+mn-ea"/>
+        <a:cs typeface="+mn-cs"/>
+      </a:defRPr>
+    </a:lvl3pPr>
+    <a:lvl4pPr marL="1371600" algn="l" defTabSz="914400" rtl="0" eaLnBrk="1" latinLnBrk="0" hangingPunct="1">
+      <a:defRPr sz="1200" kern="1200">
+        <a:solidFill>
+          <a:schemeClr val="tx1"/>
+        </a:solidFill>
+        <a:latin typeface="+mn-lt"/>
+        <a:ea typeface="+mn-ea"/>
+        <a:cs typeface="+mn-cs"/>
+      </a:defRPr>
+    </a:lvl4pPr>
+    <a:lvl5pPr marL="1828800" algn="l" defTabSz="914400" rtl="0" eaLnBrk="1" latinLnBrk="0" hangingPunct="1">
+      <a:defRPr sz="1200" kern="1200">
+        <a:solidFill>
+          <a:schemeClr val="tx1"/>
+        </a:solidFill>
+        <a:latin typeface="+mn-lt"/>
+        <a:ea typeface="+mn-ea"/>
+        <a:cs typeface="+mn-cs"/>
+      </a:defRPr>
+    </a:lvl5pPr>
+    <a:lvl6pPr marL="2286000" algn="l" defTabSz="914400" rtl="0" eaLnBrk="1" latinLnBrk="0" hangingPunct="1">
+      <a:defRPr sz="1200" kern="1200">
+        <a:solidFill>
+          <a:schemeClr val="tx1"/>
+        </a:solidFill>
+        <a:latin typeface="+mn-lt"/>
+        <a:ea typeface="+mn-ea"/>
+        <a:cs typeface="+mn-cs"/>
+      </a:defRPr>
+    </a:lvl6pPr>
+    <a:lvl7pPr marL="2743200" algn="l" defTabSz="914400" rtl="0" eaLnBrk="1" latinLnBrk="0" hangingPunct="1">
+      <a:defRPr sz="1200" kern="1200">
+        <a:solidFill>
+          <a:schemeClr val="tx1"/>
+        </a:solidFill>
+        <a:latin typeface="+mn-lt"/>
+        <a:ea typeface="+mn-ea"/>
+        <a:cs typeface="+mn-cs"/>
+      </a:defRPr>
+    </a:lvl7pPr>
+    <a:lvl8pPr marL="3200400" algn="l" defTabSz="914400" rtl="0" eaLnBrk="1" latinLnBrk="0" hangingPunct="1">
+      <a:defRPr sz="1200" kern="1200">
+        <a:solidFill>
+          <a:schemeClr val="tx1"/>
+        </a:solidFill>
+        <a:latin typeface="+mn-lt"/>
+        <a:ea typeface="+mn-ea"/>
+        <a:cs typeface="+mn-cs"/>
+      </a:defRPr>
+    </a:lvl8pPr>
+    <a:lvl9pPr marL="3657600" algn="l" defTabSz="914400" rtl="0" eaLnBrk="1" latinLnBrk="0" hangingPunct="1">
+      <a:defRPr sz="1200" kern="1200">
+        <a:solidFill>
+          <a:schemeClr val="tx1"/>
+        </a:solidFill>
+        <a:latin typeface="+mn-lt"/>
+        <a:ea typeface="+mn-ea"/>
+        <a:cs typeface="+mn-cs"/>
+      </a:defRPr>
+    </a:lvl9pPr>
+  </p:notesStyle>
+</p:notesMaster>
+</file>
+
+<file path=ppt/notesSlides/notesSlide1.xml><?xml version="1.0" encoding="utf-8"?>
+<p:notes xmlns:a="http://schemas.openxmlformats.org/drawingml/2006/main" xmlns:r="http://schemas.openxmlformats.org/officeDocument/2006/relationships" xmlns:p="http://schemas.openxmlformats.org/presentationml/2006/main">
+  <p:cSld>
+    <p:spTree>
+      <p:nvGrpSpPr>
+        <p:cNvPr id="1" name=""/>
+        <p:cNvGrpSpPr/>
+        <p:nvPr/>
+      </p:nvGrpSpPr>
+      <p:grpSpPr>
+        <a:xfrm>
+          <a:off x="0" y="0"/>
+          <a:ext cx="0" cy="0"/>
+          <a:chOff x="0" y="0"/>
+          <a:chExt cx="0" cy="0"/>
+        </a:xfrm>
+      </p:grpSpPr>
+      <p:sp>
+        <p:nvSpPr>
+          <p:cNvPr id="2" name="Slide Image Placeholder 1"/>
+          <p:cNvSpPr>
+            <a:spLocks noGrp="1" noRot="1" noChangeAspect="1"/>
+          </p:cNvSpPr>
+          <p:nvPr>
+            <p:ph type="sldImg"/>
+          </p:nvPr>
+        </p:nvSpPr>
+        <p:spPr/>
+      </p:sp>
+      <p:sp>
+        <p:nvSpPr>
+          <p:cNvPr id="3" name="Notes Placeholder 2"/>
+          <p:cNvSpPr>
+            <a:spLocks noGrp="1"/>
+          </p:cNvSpPr>
+          <p:nvPr>
+            <p:ph type="body" idx="1"/>
+          </p:nvPr>
+        </p:nvSpPr>
+        <p:spPr/>
+        <p:txBody>
+          <a:bodyPr/>
+          <a:lstStyle/>
+          <a:p>
+            <a:r>
+              <a:rPr lang="en-US" dirty="0" smtClean="0"/>
+              <a:t>A lot of</a:t>
+            </a:r>
+            <a:r>
+              <a:rPr lang="en-US" baseline="0" dirty="0" smtClean="0"/>
+              <a:t> data. Too little time. So we decided to focus on event descriptions only. We can definitely improve the recommendation accuracy by using other features.</a:t>
+            </a:r>
+            <a:endParaRPr lang="en-US" dirty="0"/>
+          </a:p>
+        </p:txBody>
+      </p:sp>
+      <p:sp>
+        <p:nvSpPr>
+          <p:cNvPr id="4" name="Slide Number Placeholder 3"/>
+          <p:cNvSpPr>
+            <a:spLocks noGrp="1"/>
+          </p:cNvSpPr>
+          <p:nvPr>
+            <p:ph type="sldNum" sz="quarter" idx="10"/>
+          </p:nvPr>
+        </p:nvSpPr>
+        <p:spPr/>
+        <p:txBody>
+          <a:bodyPr/>
+          <a:lstStyle/>
+          <a:p>
+            <a:fld id="{30297E2A-C7AB-874C-97FE-7F67254B703E}" type="slidenum">
+              <a:rPr lang="en-US" smtClean="0"/>
+              <a:t>5</a:t>
+            </a:fld>
+            <a:endParaRPr lang="en-US"/>
+          </a:p>
+        </p:txBody>
+      </p:sp>
+    </p:spTree>
+    <p:extLst>
+      <p:ext uri="{BB962C8B-B14F-4D97-AF65-F5344CB8AC3E}">
+        <p14:creationId xmlns:p14="http://schemas.microsoft.com/office/powerpoint/2010/main" val="1231670076"/>
+      </p:ext>
+    </p:extLst>
+  </p:cSld>
+  <p:clrMapOvr>
+    <a:masterClrMapping/>
+  </p:clrMapOvr>
+</p:notes>
+</file>
+
+<file path=ppt/notesSlides/notesSlide2.xml><?xml version="1.0" encoding="utf-8"?>
+<p:notes xmlns:a="http://schemas.openxmlformats.org/drawingml/2006/main" xmlns:r="http://schemas.openxmlformats.org/officeDocument/2006/relationships" xmlns:p="http://schemas.openxmlformats.org/presentationml/2006/main">
+  <p:cSld>
+    <p:spTree>
+      <p:nvGrpSpPr>
+        <p:cNvPr id="1" name=""/>
+        <p:cNvGrpSpPr/>
+        <p:nvPr/>
+      </p:nvGrpSpPr>
+      <p:grpSpPr>
+        <a:xfrm>
+          <a:off x="0" y="0"/>
+          <a:ext cx="0" cy="0"/>
+          <a:chOff x="0" y="0"/>
+          <a:chExt cx="0" cy="0"/>
+        </a:xfrm>
+      </p:grpSpPr>
+      <p:sp>
+        <p:nvSpPr>
+          <p:cNvPr id="2" name="Slide Image Placeholder 1"/>
+          <p:cNvSpPr>
+            <a:spLocks noGrp="1" noRot="1" noChangeAspect="1"/>
+          </p:cNvSpPr>
+          <p:nvPr>
+            <p:ph type="sldImg"/>
+          </p:nvPr>
+        </p:nvSpPr>
+        <p:spPr/>
+      </p:sp>
+      <p:sp>
+        <p:nvSpPr>
+          <p:cNvPr id="3" name="Notes Placeholder 2"/>
+          <p:cNvSpPr>
+            <a:spLocks noGrp="1"/>
+          </p:cNvSpPr>
+          <p:nvPr>
+            <p:ph type="body" idx="1"/>
+          </p:nvPr>
+        </p:nvSpPr>
+        <p:spPr/>
+        <p:txBody>
+          <a:bodyPr/>
+          <a:lstStyle/>
+          <a:p>
+            <a:r>
+              <a:rPr lang="en-US" dirty="0" smtClean="0"/>
+              <a:t>TF-IDF</a:t>
+            </a:r>
+            <a:r>
+              <a:rPr lang="en-US" baseline="0" dirty="0" smtClean="0"/>
+              <a:t> calculation</a:t>
+            </a:r>
+          </a:p>
+        </p:txBody>
+      </p:sp>
+      <p:sp>
+        <p:nvSpPr>
+          <p:cNvPr id="4" name="Slide Number Placeholder 3"/>
+          <p:cNvSpPr>
+            <a:spLocks noGrp="1"/>
+          </p:cNvSpPr>
+          <p:nvPr>
+            <p:ph type="sldNum" sz="quarter" idx="10"/>
+          </p:nvPr>
+        </p:nvSpPr>
+        <p:spPr/>
+        <p:txBody>
+          <a:bodyPr/>
+          <a:lstStyle/>
+          <a:p>
+            <a:fld id="{30297E2A-C7AB-874C-97FE-7F67254B703E}" type="slidenum">
+              <a:rPr lang="en-US" smtClean="0"/>
+              <a:t>6</a:t>
+            </a:fld>
+            <a:endParaRPr lang="en-US"/>
+          </a:p>
+        </p:txBody>
+      </p:sp>
+    </p:spTree>
+    <p:extLst>
+      <p:ext uri="{BB962C8B-B14F-4D97-AF65-F5344CB8AC3E}">
+        <p14:creationId xmlns:p14="http://schemas.microsoft.com/office/powerpoint/2010/main" val="1373402993"/>
+      </p:ext>
+    </p:extLst>
+  </p:cSld>
+  <p:clrMapOvr>
+    <a:masterClrMapping/>
+  </p:clrMapOvr>
+</p:notes>
+</file>
+
+<file path=ppt/notesSlides/notesSlide3.xml><?xml version="1.0" encoding="utf-8"?>
+<p:notes xmlns:a="http://schemas.openxmlformats.org/drawingml/2006/main" xmlns:r="http://schemas.openxmlformats.org/officeDocument/2006/relationships" xmlns:p="http://schemas.openxmlformats.org/presentationml/2006/main">
+  <p:cSld>
+    <p:spTree>
+      <p:nvGrpSpPr>
+        <p:cNvPr id="1" name=""/>
+        <p:cNvGrpSpPr/>
+        <p:nvPr/>
+      </p:nvGrpSpPr>
+      <p:grpSpPr>
+        <a:xfrm>
+          <a:off x="0" y="0"/>
+          <a:ext cx="0" cy="0"/>
+          <a:chOff x="0" y="0"/>
+          <a:chExt cx="0" cy="0"/>
+        </a:xfrm>
+      </p:grpSpPr>
+      <p:sp>
+        <p:nvSpPr>
+          <p:cNvPr id="2" name="Slide Image Placeholder 1"/>
+          <p:cNvSpPr>
+            <a:spLocks noGrp="1" noRot="1" noChangeAspect="1"/>
+          </p:cNvSpPr>
+          <p:nvPr>
+            <p:ph type="sldImg"/>
+          </p:nvPr>
+        </p:nvSpPr>
+        <p:spPr/>
+      </p:sp>
+      <p:sp>
+        <p:nvSpPr>
+          <p:cNvPr id="3" name="Notes Placeholder 2"/>
+          <p:cNvSpPr>
+            <a:spLocks noGrp="1"/>
+          </p:cNvSpPr>
+          <p:nvPr>
+            <p:ph type="body" idx="1"/>
+          </p:nvPr>
+        </p:nvSpPr>
+        <p:spPr/>
+        <p:txBody>
+          <a:bodyPr/>
+          <a:lstStyle/>
+          <a:p>
+            <a:endParaRPr lang="en-US" dirty="0"/>
+          </a:p>
+        </p:txBody>
+      </p:sp>
+      <p:sp>
+        <p:nvSpPr>
+          <p:cNvPr id="4" name="Slide Number Placeholder 3"/>
+          <p:cNvSpPr>
+            <a:spLocks noGrp="1"/>
+          </p:cNvSpPr>
+          <p:nvPr>
+            <p:ph type="sldNum" sz="quarter" idx="10"/>
+          </p:nvPr>
+        </p:nvSpPr>
+        <p:spPr/>
+        <p:txBody>
+          <a:bodyPr/>
+          <a:lstStyle/>
+          <a:p>
+            <a:fld id="{30297E2A-C7AB-874C-97FE-7F67254B703E}" type="slidenum">
+              <a:rPr lang="en-US" smtClean="0"/>
+              <a:t>7</a:t>
+            </a:fld>
+            <a:endParaRPr lang="en-US"/>
+          </a:p>
+        </p:txBody>
+      </p:sp>
+    </p:spTree>
+    <p:extLst>
+      <p:ext uri="{BB962C8B-B14F-4D97-AF65-F5344CB8AC3E}">
+        <p14:creationId xmlns:p14="http://schemas.microsoft.com/office/powerpoint/2010/main" val="1617140029"/>
+      </p:ext>
+    </p:extLst>
+  </p:cSld>
+  <p:clrMapOvr>
+    <a:masterClrMapping/>
+  </p:clrMapOvr>
+</p:notes>
+</file>
+
 <file path=ppt/slideLayouts/slideLayout1.xml><?xml version="1.0" encoding="utf-8"?>
 <p:sldLayout xmlns:a="http://schemas.openxmlformats.org/drawingml/2006/main" xmlns:r="http://schemas.openxmlformats.org/officeDocument/2006/relationships" xmlns:p="http://schemas.openxmlformats.org/presentationml/2006/main" type="title" preserve="1">
   <p:cSld name="Title Slide">
@@ -4961,7 +5594,7 @@
           <a:p>
             <a:fld id="{90F19E8C-F446-4C11-9AAE-B4B295EA670E}" type="datetimeFigureOut">
               <a:rPr lang="en-US" smtClean="0"/>
-              <a:t>11/30/2016</a:t>
+              <a:t>11/30/16</a:t>
             </a:fld>
             <a:endParaRPr lang="en-US"/>
           </a:p>
@@ -5129,7 +5762,7 @@
           <a:p>
             <a:fld id="{90F19E8C-F446-4C11-9AAE-B4B295EA670E}" type="datetimeFigureOut">
               <a:rPr lang="en-US" smtClean="0"/>
-              <a:t>11/30/2016</a:t>
+              <a:t>11/30/16</a:t>
             </a:fld>
             <a:endParaRPr lang="en-US"/>
           </a:p>
@@ -5307,7 +5940,7 @@
           <a:p>
             <a:fld id="{90F19E8C-F446-4C11-9AAE-B4B295EA670E}" type="datetimeFigureOut">
               <a:rPr lang="en-US" smtClean="0"/>
-              <a:t>11/30/2016</a:t>
+              <a:t>11/30/16</a:t>
             </a:fld>
             <a:endParaRPr lang="en-US"/>
           </a:p>
@@ -5475,7 +6108,7 @@
           <a:p>
             <a:fld id="{90F19E8C-F446-4C11-9AAE-B4B295EA670E}" type="datetimeFigureOut">
               <a:rPr lang="en-US" smtClean="0"/>
-              <a:t>11/30/2016</a:t>
+              <a:t>11/30/16</a:t>
             </a:fld>
             <a:endParaRPr lang="en-US"/>
           </a:p>
@@ -5720,7 +6353,7 @@
           <a:p>
             <a:fld id="{90F19E8C-F446-4C11-9AAE-B4B295EA670E}" type="datetimeFigureOut">
               <a:rPr lang="en-US" smtClean="0"/>
-              <a:t>11/30/2016</a:t>
+              <a:t>11/30/16</a:t>
             </a:fld>
             <a:endParaRPr lang="en-US"/>
           </a:p>
@@ -5949,7 +6582,7 @@
           <a:p>
             <a:fld id="{90F19E8C-F446-4C11-9AAE-B4B295EA670E}" type="datetimeFigureOut">
               <a:rPr lang="en-US" smtClean="0"/>
-              <a:t>11/30/2016</a:t>
+              <a:t>11/30/16</a:t>
             </a:fld>
             <a:endParaRPr lang="en-US"/>
           </a:p>
@@ -6313,7 +6946,7 @@
           <a:p>
             <a:fld id="{90F19E8C-F446-4C11-9AAE-B4B295EA670E}" type="datetimeFigureOut">
               <a:rPr lang="en-US" smtClean="0"/>
-              <a:t>11/30/2016</a:t>
+              <a:t>11/30/16</a:t>
             </a:fld>
             <a:endParaRPr lang="en-US"/>
           </a:p>
@@ -6430,7 +7063,7 @@
           <a:p>
             <a:fld id="{90F19E8C-F446-4C11-9AAE-B4B295EA670E}" type="datetimeFigureOut">
               <a:rPr lang="en-US" smtClean="0"/>
-              <a:t>11/30/2016</a:t>
+              <a:t>11/30/16</a:t>
             </a:fld>
             <a:endParaRPr lang="en-US"/>
           </a:p>
@@ -6525,7 +7158,7 @@
           <a:p>
             <a:fld id="{90F19E8C-F446-4C11-9AAE-B4B295EA670E}" type="datetimeFigureOut">
               <a:rPr lang="en-US" smtClean="0"/>
-              <a:t>11/30/2016</a:t>
+              <a:t>11/30/16</a:t>
             </a:fld>
             <a:endParaRPr lang="en-US"/>
           </a:p>
@@ -6800,7 +7433,7 @@
           <a:p>
             <a:fld id="{90F19E8C-F446-4C11-9AAE-B4B295EA670E}" type="datetimeFigureOut">
               <a:rPr lang="en-US" smtClean="0"/>
-              <a:t>11/30/2016</a:t>
+              <a:t>11/30/16</a:t>
             </a:fld>
             <a:endParaRPr lang="en-US"/>
           </a:p>
@@ -7052,7 +7685,7 @@
           <a:p>
             <a:fld id="{90F19E8C-F446-4C11-9AAE-B4B295EA670E}" type="datetimeFigureOut">
               <a:rPr lang="en-US" smtClean="0"/>
-              <a:t>11/30/2016</a:t>
+              <a:t>11/30/16</a:t>
             </a:fld>
             <a:endParaRPr lang="en-US"/>
           </a:p>
@@ -7266,7 +7899,7 @@
           <a:p>
             <a:fld id="{90F19E8C-F446-4C11-9AAE-B4B295EA670E}" type="datetimeFigureOut">
               <a:rPr lang="en-US" smtClean="0"/>
-              <a:t>11/30/2016</a:t>
+              <a:t>11/30/16</a:t>
             </a:fld>
             <a:endParaRPr lang="en-US"/>
           </a:p>
@@ -7907,6 +8540,177 @@
   <p:clrMapOvr>
     <a:masterClrMapping/>
   </p:clrMapOvr>
+  <p:timing>
+    <p:tnLst>
+      <p:par>
+        <p:cTn id="1" dur="indefinite" restart="never" nodeType="tmRoot"/>
+      </p:par>
+    </p:tnLst>
+  </p:timing>
+</p:sld>
+</file>
+
+<file path=ppt/slides/slide10.xml><?xml version="1.0" encoding="utf-8"?>
+<p:sld xmlns:a="http://schemas.openxmlformats.org/drawingml/2006/main" xmlns:r="http://schemas.openxmlformats.org/officeDocument/2006/relationships" xmlns:p="http://schemas.openxmlformats.org/presentationml/2006/main">
+  <p:cSld>
+    <p:spTree>
+      <p:nvGrpSpPr>
+        <p:cNvPr id="1" name=""/>
+        <p:cNvGrpSpPr/>
+        <p:nvPr/>
+      </p:nvGrpSpPr>
+      <p:grpSpPr>
+        <a:xfrm>
+          <a:off x="0" y="0"/>
+          <a:ext cx="0" cy="0"/>
+          <a:chOff x="0" y="0"/>
+          <a:chExt cx="0" cy="0"/>
+        </a:xfrm>
+      </p:grpSpPr>
+      <p:sp>
+        <p:nvSpPr>
+          <p:cNvPr id="2" name="Title 1"/>
+          <p:cNvSpPr>
+            <a:spLocks noGrp="1"/>
+          </p:cNvSpPr>
+          <p:nvPr>
+            <p:ph type="title"/>
+          </p:nvPr>
+        </p:nvSpPr>
+        <p:spPr/>
+        <p:txBody>
+          <a:bodyPr/>
+          <a:lstStyle/>
+          <a:p>
+            <a:r>
+              <a:rPr lang="en-US" dirty="0">
+                <a:solidFill>
+                  <a:schemeClr val="bg1"/>
+                </a:solidFill>
+              </a:rPr>
+              <a:t>Appendix</a:t>
+            </a:r>
+          </a:p>
+        </p:txBody>
+      </p:sp>
+      <p:sp>
+        <p:nvSpPr>
+          <p:cNvPr id="3" name="Content Placeholder 2"/>
+          <p:cNvSpPr>
+            <a:spLocks noGrp="1"/>
+          </p:cNvSpPr>
+          <p:nvPr>
+            <p:ph idx="1"/>
+          </p:nvPr>
+        </p:nvSpPr>
+        <p:spPr/>
+        <p:txBody>
+          <a:bodyPr/>
+          <a:lstStyle/>
+          <a:p>
+            <a:r>
+              <a:rPr lang="en-US" dirty="0" err="1">
+                <a:solidFill>
+                  <a:schemeClr val="bg1"/>
+                </a:solidFill>
+              </a:rPr>
+              <a:t>Github</a:t>
+            </a:r>
+            <a:r>
+              <a:rPr lang="en-US" dirty="0">
+                <a:solidFill>
+                  <a:schemeClr val="bg1"/>
+                </a:solidFill>
+              </a:rPr>
+              <a:t> URL: </a:t>
+            </a:r>
+            <a:r>
+              <a:rPr lang="en-US" dirty="0">
+                <a:solidFill>
+                  <a:schemeClr val="bg1"/>
+                </a:solidFill>
+                <a:hlinkClick r:id="rId2"/>
+              </a:rPr>
+              <a:t>https://github.com/dhiviyadhanasekar/Events_Recommender</a:t>
+            </a:r>
+            <a:r>
+              <a:rPr lang="en-US" dirty="0">
+                <a:solidFill>
+                  <a:schemeClr val="bg1"/>
+                </a:solidFill>
+              </a:rPr>
+              <a:t> </a:t>
+            </a:r>
+          </a:p>
+          <a:p>
+            <a:endParaRPr lang="en-US" dirty="0">
+              <a:solidFill>
+                <a:schemeClr val="bg1"/>
+              </a:solidFill>
+            </a:endParaRPr>
+          </a:p>
+          <a:p>
+            <a:r>
+              <a:rPr lang="en-US" dirty="0">
+                <a:solidFill>
+                  <a:schemeClr val="bg1"/>
+                </a:solidFill>
+              </a:rPr>
+              <a:t>Dataset: </a:t>
+            </a:r>
+            <a:r>
+              <a:rPr lang="en-US" dirty="0">
+                <a:solidFill>
+                  <a:srgbClr val="FFC000"/>
+                </a:solidFill>
+                <a:hlinkClick r:id="rId3"/>
+              </a:rPr>
+              <a:t>https://www.kaggle.com/c/event-recommendation-engine-challenge/data</a:t>
+            </a:r>
+            <a:r>
+              <a:rPr lang="en-US" dirty="0">
+                <a:solidFill>
+                  <a:srgbClr val="FFC000"/>
+                </a:solidFill>
+              </a:rPr>
+              <a:t> </a:t>
+            </a:r>
+          </a:p>
+          <a:p>
+            <a:pPr lvl="1"/>
+            <a:endParaRPr lang="en-US" dirty="0">
+              <a:solidFill>
+                <a:schemeClr val="bg1"/>
+              </a:solidFill>
+            </a:endParaRPr>
+          </a:p>
+          <a:p>
+            <a:pPr lvl="1"/>
+            <a:endParaRPr lang="en-US" dirty="0">
+              <a:solidFill>
+                <a:schemeClr val="bg1"/>
+              </a:solidFill>
+            </a:endParaRPr>
+          </a:p>
+        </p:txBody>
+      </p:sp>
+    </p:spTree>
+    <p:extLst>
+      <p:ext uri="{BB962C8B-B14F-4D97-AF65-F5344CB8AC3E}">
+        <p14:creationId xmlns:p14="http://schemas.microsoft.com/office/powerpoint/2010/main" val="1700977332"/>
+      </p:ext>
+    </p:extLst>
+  </p:cSld>
+  <p:clrMapOvr>
+    <a:masterClrMapping/>
+  </p:clrMapOvr>
+  <p:timing>
+    <p:tnLst>
+      <p:par>
+        <p:cTn id="1" dur="indefinite" restart="never" nodeType="tmRoot"/>
+      </p:par>
+    </p:tnLst>
+  </p:timing>
 </p:sld>
 </file>
 
@@ -7980,7 +8784,23 @@
                   <a:schemeClr val="bg1"/>
                 </a:solidFill>
               </a:rPr>
-              <a:t>  Why an events recommender?</a:t>
+              <a:t>  Why an </a:t>
+            </a:r>
+            <a:r>
+              <a:rPr lang="en-US" sz="3200" dirty="0" smtClean="0">
+                <a:solidFill>
+                  <a:schemeClr val="bg1"/>
+                </a:solidFill>
+              </a:rPr>
+              <a:t>event recommender</a:t>
+            </a:r>
+            <a:r>
+              <a:rPr lang="en-US" sz="3200" dirty="0">
+                <a:solidFill>
+                  <a:schemeClr val="bg1"/>
+                </a:solidFill>
+              </a:rPr>
+              <a:t>?</a:t>
             </a:r>
           </a:p>
           <a:p>
@@ -8030,8 +8850,21 @@
                   <a:schemeClr val="bg1"/>
                 </a:solidFill>
               </a:rPr>
-              <a:t>  Results</a:t>
-            </a:r>
+              <a:t>  </a:t>
+            </a:r>
+            <a:r>
+              <a:rPr lang="en-US" sz="3200" dirty="0" smtClean="0">
+                <a:solidFill>
+                  <a:schemeClr val="bg1"/>
+                </a:solidFill>
+              </a:rPr>
+              <a:t>Challenges we faced</a:t>
+            </a:r>
+            <a:endParaRPr lang="en-US" sz="3200" dirty="0">
+              <a:solidFill>
+                <a:schemeClr val="bg1"/>
+              </a:solidFill>
+            </a:endParaRPr>
           </a:p>
         </p:txBody>
       </p:sp>
@@ -8045,6 +8878,13 @@
   <p:clrMapOvr>
     <a:masterClrMapping/>
   </p:clrMapOvr>
+  <p:timing>
+    <p:tnLst>
+      <p:par>
+        <p:cTn id="1" dur="indefinite" restart="never" nodeType="tmRoot"/>
+      </p:par>
+    </p:tnLst>
+  </p:timing>
 </p:sld>
 </file>
 
@@ -8694,6 +9534,105 @@
           <a:lstStyle/>
           <a:p>
             <a:r>
+              <a:rPr lang="en-US" dirty="0" smtClean="0">
+                <a:solidFill>
+                  <a:schemeClr val="bg1"/>
+                </a:solidFill>
+              </a:rPr>
+              <a:t>					Demo</a:t>
+            </a:r>
+            <a:endParaRPr lang="en-US" dirty="0">
+              <a:solidFill>
+                <a:schemeClr val="bg1"/>
+              </a:solidFill>
+            </a:endParaRPr>
+          </a:p>
+        </p:txBody>
+      </p:sp>
+      <p:sp>
+        <p:nvSpPr>
+          <p:cNvPr id="3" name="Content Placeholder 2"/>
+          <p:cNvSpPr>
+            <a:spLocks noGrp="1"/>
+          </p:cNvSpPr>
+          <p:nvPr>
+            <p:ph idx="1"/>
+          </p:nvPr>
+        </p:nvSpPr>
+        <p:spPr/>
+        <p:txBody>
+          <a:bodyPr/>
+          <a:lstStyle/>
+          <a:p>
+            <a:r>
+              <a:rPr lang="en-US" dirty="0" smtClean="0">
+                <a:solidFill>
+                  <a:schemeClr val="bg1"/>
+                </a:solidFill>
+              </a:rPr>
+              <a:t>Add screenshot here</a:t>
+            </a:r>
+            <a:endParaRPr lang="en-US" dirty="0">
+              <a:solidFill>
+                <a:schemeClr val="bg1"/>
+              </a:solidFill>
+            </a:endParaRPr>
+          </a:p>
+        </p:txBody>
+      </p:sp>
+    </p:spTree>
+    <p:extLst>
+      <p:ext uri="{BB962C8B-B14F-4D97-AF65-F5344CB8AC3E}">
+        <p14:creationId xmlns:p14="http://schemas.microsoft.com/office/powerpoint/2010/main" val="1914683071"/>
+      </p:ext>
+    </p:extLst>
+  </p:cSld>
+  <p:clrMapOvr>
+    <a:masterClrMapping/>
+  </p:clrMapOvr>
+  <p:timing>
+    <p:tnLst>
+      <p:par>
+        <p:cTn id="1" dur="indefinite" restart="never" nodeType="tmRoot"/>
+      </p:par>
+    </p:tnLst>
+  </p:timing>
+</p:sld>
+</file>
+
+<file path=ppt/slides/slide5.xml><?xml version="1.0" encoding="utf-8"?>
+<p:sld xmlns:a="http://schemas.openxmlformats.org/drawingml/2006/main" xmlns:r="http://schemas.openxmlformats.org/officeDocument/2006/relationships" xmlns:p="http://schemas.openxmlformats.org/presentationml/2006/main">
+  <p:cSld>
+    <p:spTree>
+      <p:nvGrpSpPr>
+        <p:cNvPr id="1" name=""/>
+        <p:cNvGrpSpPr/>
+        <p:nvPr/>
+      </p:nvGrpSpPr>
+      <p:grpSpPr>
+        <a:xfrm>
+          <a:off x="0" y="0"/>
+          <a:ext cx="0" cy="0"/>
+          <a:chOff x="0" y="0"/>
+          <a:chExt cx="0" cy="0"/>
+        </a:xfrm>
+      </p:grpSpPr>
+      <p:sp>
+        <p:nvSpPr>
+          <p:cNvPr id="2" name="Title 1"/>
+          <p:cNvSpPr>
+            <a:spLocks noGrp="1"/>
+          </p:cNvSpPr>
+          <p:nvPr>
+            <p:ph type="title"/>
+          </p:nvPr>
+        </p:nvSpPr>
+        <p:spPr/>
+        <p:txBody>
+          <a:bodyPr/>
+          <a:lstStyle/>
+          <a:p>
+            <a:r>
               <a:rPr lang="en-US" dirty="0">
                 <a:solidFill>
                   <a:schemeClr val="bg1"/>
@@ -8715,7 +9654,7 @@
           </p:nvPr>
         </p:nvPicPr>
         <p:blipFill>
-          <a:blip r:embed="rId2">
+          <a:blip r:embed="rId3">
             <a:extLst>
               <a:ext uri="{28A0092B-C50C-407E-A947-70E740481C1C}">
                 <a14:useLocalDpi xmlns:a14="http://schemas.microsoft.com/office/drawing/2010/main" val="0"/>
@@ -8742,7 +9681,7 @@
           <p:nvPr/>
         </p:nvPicPr>
         <p:blipFill>
-          <a:blip r:embed="rId3">
+          <a:blip r:embed="rId4">
             <a:extLst>
               <a:ext uri="{28A0092B-C50C-407E-A947-70E740481C1C}">
                 <a14:useLocalDpi xmlns:a14="http://schemas.microsoft.com/office/drawing/2010/main" val="0"/>
@@ -8772,7 +9711,7 @@
           <p:nvPr/>
         </p:nvPicPr>
         <p:blipFill>
-          <a:blip r:embed="rId4">
+          <a:blip r:embed="rId5">
             <a:extLst>
               <a:ext uri="{28A0092B-C50C-407E-A947-70E740481C1C}">
                 <a14:useLocalDpi xmlns:a14="http://schemas.microsoft.com/office/drawing/2010/main" val="0"/>
@@ -9082,10 +10021,17 @@
   <p:clrMapOvr>
     <a:masterClrMapping/>
   </p:clrMapOvr>
+  <p:timing>
+    <p:tnLst>
+      <p:par>
+        <p:cTn id="1" dur="indefinite" restart="never" nodeType="tmRoot"/>
+      </p:par>
+    </p:tnLst>
+  </p:timing>
 </p:sld>
 </file>
 
-<file path=ppt/slides/slide5.xml><?xml version="1.0" encoding="utf-8"?>
+<file path=ppt/slides/slide6.xml><?xml version="1.0" encoding="utf-8"?>
 <p:sld xmlns:a="http://schemas.openxmlformats.org/drawingml/2006/main" xmlns:r="http://schemas.openxmlformats.org/officeDocument/2006/relationships" xmlns:p="http://schemas.openxmlformats.org/presentationml/2006/main">
   <p:cSld>
     <p:spTree>
@@ -9117,6 +10063,116 @@
           <a:bodyPr/>
           <a:lstStyle/>
           <a:p>
+            <a:pPr algn="ctr"/>
+            <a:r>
+              <a:rPr lang="en-US" dirty="0" smtClean="0">
+                <a:solidFill>
+                  <a:schemeClr val="bg1"/>
+                </a:solidFill>
+              </a:rPr>
+              <a:t>Why Big Data?</a:t>
+            </a:r>
+            <a:endParaRPr lang="en-US" dirty="0">
+              <a:solidFill>
+                <a:schemeClr val="bg1"/>
+              </a:solidFill>
+            </a:endParaRPr>
+          </a:p>
+        </p:txBody>
+      </p:sp>
+      <p:sp>
+        <p:nvSpPr>
+          <p:cNvPr id="3" name="Content Placeholder 2"/>
+          <p:cNvSpPr>
+            <a:spLocks noGrp="1"/>
+          </p:cNvSpPr>
+          <p:nvPr>
+            <p:ph idx="1"/>
+          </p:nvPr>
+        </p:nvSpPr>
+        <p:spPr>
+          <a:xfrm>
+            <a:off x="838200" y="2903798"/>
+            <a:ext cx="10515600" cy="1654554"/>
+          </a:xfrm>
+        </p:spPr>
+        <p:txBody>
+          <a:bodyPr>
+            <a:normAutofit/>
+          </a:bodyPr>
+          <a:lstStyle/>
+          <a:p>
+            <a:pPr marL="0" indent="0" algn="ctr">
+              <a:buNone/>
+            </a:pPr>
+            <a:r>
+              <a:rPr lang="en-US" sz="8000" dirty="0" smtClean="0">
+                <a:solidFill>
+                  <a:schemeClr val="bg1"/>
+                </a:solidFill>
+              </a:rPr>
+              <a:t>3M events</a:t>
+            </a:r>
+            <a:endParaRPr lang="en-US" sz="8000" dirty="0">
+              <a:solidFill>
+                <a:schemeClr val="bg1"/>
+              </a:solidFill>
+            </a:endParaRPr>
+          </a:p>
+        </p:txBody>
+      </p:sp>
+    </p:spTree>
+    <p:extLst>
+      <p:ext uri="{BB962C8B-B14F-4D97-AF65-F5344CB8AC3E}">
+        <p14:creationId xmlns:p14="http://schemas.microsoft.com/office/powerpoint/2010/main" val="1143396987"/>
+      </p:ext>
+    </p:extLst>
+  </p:cSld>
+  <p:clrMapOvr>
+    <a:masterClrMapping/>
+  </p:clrMapOvr>
+  <p:timing>
+    <p:tnLst>
+      <p:par>
+        <p:cTn id="1" dur="indefinite" restart="never" nodeType="tmRoot"/>
+      </p:par>
+    </p:tnLst>
+  </p:timing>
+</p:sld>
+</file>
+
+<file path=ppt/slides/slide7.xml><?xml version="1.0" encoding="utf-8"?>
+<p:sld xmlns:a="http://schemas.openxmlformats.org/drawingml/2006/main" xmlns:r="http://schemas.openxmlformats.org/officeDocument/2006/relationships" xmlns:p="http://schemas.openxmlformats.org/presentationml/2006/main">
+  <p:cSld>
+    <p:spTree>
+      <p:nvGrpSpPr>
+        <p:cNvPr id="1" name=""/>
+        <p:cNvGrpSpPr/>
+        <p:nvPr/>
+      </p:nvGrpSpPr>
+      <p:grpSpPr>
+        <a:xfrm>
+          <a:off x="0" y="0"/>
+          <a:ext cx="0" cy="0"/>
+          <a:chOff x="0" y="0"/>
+          <a:chExt cx="0" cy="0"/>
+        </a:xfrm>
+      </p:grpSpPr>
+      <p:sp>
+        <p:nvSpPr>
+          <p:cNvPr id="2" name="Title 1"/>
+          <p:cNvSpPr>
+            <a:spLocks noGrp="1"/>
+          </p:cNvSpPr>
+          <p:nvPr>
+            <p:ph type="title"/>
+          </p:nvPr>
+        </p:nvSpPr>
+        <p:spPr/>
+        <p:txBody>
+          <a:bodyPr/>
+          <a:lstStyle/>
+          <a:p>
             <a:r>
               <a:rPr lang="en-US" dirty="0">
                 <a:solidFill>
@@ -9128,67 +10184,67 @@
           </a:p>
         </p:txBody>
       </p:sp>
+      <p:sp>
+        <p:nvSpPr>
+          <p:cNvPr id="5" name="Rectangle 4"/>
+          <p:cNvSpPr/>
+          <p:nvPr/>
+        </p:nvSpPr>
+        <p:spPr>
+          <a:xfrm>
+            <a:off x="6886684" y="1795698"/>
+            <a:ext cx="1179865" cy="3930927"/>
+          </a:xfrm>
+          <a:prstGeom prst="rect">
+            <a:avLst/>
+          </a:prstGeom>
+          <a:solidFill>
+            <a:srgbClr val="D85E28"/>
+          </a:solidFill>
+        </p:spPr>
+        <p:style>
+          <a:lnRef idx="2">
+            <a:schemeClr val="accent1">
+              <a:shade val="50000"/>
+            </a:schemeClr>
+          </a:lnRef>
+          <a:fillRef idx="1">
+            <a:schemeClr val="accent1"/>
+          </a:fillRef>
+          <a:effectRef idx="0">
+            <a:schemeClr val="accent1"/>
+          </a:effectRef>
+          <a:fontRef idx="minor">
+            <a:schemeClr val="lt1"/>
+          </a:fontRef>
+        </p:style>
+        <p:txBody>
+          <a:bodyPr rtlCol="0" anchor="ctr"/>
+          <a:lstStyle/>
+          <a:p>
+            <a:pPr algn="ctr"/>
+            <a:r>
+              <a:rPr lang="en-US" sz="2800" dirty="0" err="1"/>
+              <a:t>HBase</a:t>
+            </a:r>
+            <a:endParaRPr lang="en-US" sz="2800" dirty="0"/>
+          </a:p>
+        </p:txBody>
+      </p:sp>
       <p:grpSp>
         <p:nvGrpSpPr>
-          <p:cNvPr id="4" name="Group 3"/>
+          <p:cNvPr id="3" name="Group 2"/>
           <p:cNvGrpSpPr/>
           <p:nvPr/>
         </p:nvGrpSpPr>
         <p:grpSpPr>
           <a:xfrm>
-            <a:off x="644356" y="1795698"/>
-            <a:ext cx="10654208" cy="4546108"/>
-            <a:chOff x="644356" y="1795698"/>
-            <a:chExt cx="10654208" cy="4546108"/>
+            <a:off x="687510" y="1791817"/>
+            <a:ext cx="6139901" cy="1683913"/>
+            <a:chOff x="644356" y="3852969"/>
+            <a:chExt cx="6139901" cy="1683913"/>
           </a:xfrm>
         </p:grpSpPr>
-        <p:sp>
-          <p:nvSpPr>
-            <p:cNvPr id="5" name="Rectangle 4"/>
-            <p:cNvSpPr/>
-            <p:nvPr/>
-          </p:nvSpPr>
-          <p:spPr>
-            <a:xfrm>
-              <a:off x="6886684" y="1795698"/>
-              <a:ext cx="1179865" cy="3930927"/>
-            </a:xfrm>
-            <a:prstGeom prst="rect">
-              <a:avLst/>
-            </a:prstGeom>
-            <a:solidFill>
-              <a:srgbClr val="D85E28"/>
-            </a:solidFill>
-          </p:spPr>
-          <p:style>
-            <a:lnRef idx="2">
-              <a:schemeClr val="accent1">
-                <a:shade val="50000"/>
-              </a:schemeClr>
-            </a:lnRef>
-            <a:fillRef idx="1">
-              <a:schemeClr val="accent1"/>
-            </a:fillRef>
-            <a:effectRef idx="0">
-              <a:schemeClr val="accent1"/>
-            </a:effectRef>
-            <a:fontRef idx="minor">
-              <a:schemeClr val="lt1"/>
-            </a:fontRef>
-          </p:style>
-          <p:txBody>
-            <a:bodyPr rtlCol="0" anchor="ctr"/>
-            <a:lstStyle/>
-            <a:p>
-              <a:pPr algn="ctr"/>
-              <a:r>
-                <a:rPr lang="en-US" sz="2800" dirty="0" err="1"/>
-                <a:t>HBase</a:t>
-              </a:r>
-              <a:endParaRPr lang="en-US" sz="2800" dirty="0"/>
-            </a:p>
-          </p:txBody>
-        </p:sp>
         <p:sp>
           <p:nvSpPr>
             <p:cNvPr id="6" name="Rounded Rectangle 5"/>
@@ -9298,7 +10354,7 @@
             <p:nvPr>
               <p:extLst>
                 <p:ext uri="{D42A27DB-BD31-4B8C-83A1-F6EECF244321}">
-                  <p14:modId xmlns:p14="http://schemas.microsoft.com/office/powerpoint/2010/main" val="2883811595"/>
+                  <p14:modId xmlns:p14="http://schemas.microsoft.com/office/powerpoint/2010/main" val="859025581"/>
                 </p:ext>
               </p:extLst>
             </p:nvPr>
@@ -9309,10 +10365,68 @@
           </p:xfrm>
           <a:graphic>
             <a:graphicData uri="http://schemas.openxmlformats.org/drawingml/2006/diagram">
-              <dgm:relIds xmlns:dgm="http://schemas.openxmlformats.org/drawingml/2006/diagram" xmlns:r="http://schemas.openxmlformats.org/officeDocument/2006/relationships" r:dm="rId2" r:lo="rId3" r:qs="rId4" r:cs="rId5"/>
+              <dgm:relIds xmlns:dgm="http://schemas.openxmlformats.org/drawingml/2006/diagram" xmlns:r="http://schemas.openxmlformats.org/officeDocument/2006/relationships" r:dm="rId3" r:lo="rId4" r:qs="rId5" r:cs="rId6"/>
             </a:graphicData>
           </a:graphic>
         </p:graphicFrame>
+        <p:sp>
+          <p:nvSpPr>
+            <p:cNvPr id="17" name="Rounded Rectangle 16"/>
+            <p:cNvSpPr/>
+            <p:nvPr/>
+          </p:nvSpPr>
+          <p:spPr>
+            <a:xfrm>
+              <a:off x="644356" y="3893507"/>
+              <a:ext cx="1102299" cy="1643375"/>
+            </a:xfrm>
+            <a:prstGeom prst="roundRect">
+              <a:avLst/>
+            </a:prstGeom>
+          </p:spPr>
+          <p:style>
+            <a:lnRef idx="2">
+              <a:schemeClr val="accent1">
+                <a:shade val="50000"/>
+              </a:schemeClr>
+            </a:lnRef>
+            <a:fillRef idx="1">
+              <a:schemeClr val="accent1"/>
+            </a:fillRef>
+            <a:effectRef idx="0">
+              <a:schemeClr val="accent1"/>
+            </a:effectRef>
+            <a:fontRef idx="minor">
+              <a:schemeClr val="lt1"/>
+            </a:fontRef>
+          </p:style>
+          <p:txBody>
+            <a:bodyPr rtlCol="0" anchor="ctr"/>
+            <a:lstStyle/>
+            <a:p>
+              <a:pPr algn="ctr"/>
+              <a:r>
+                <a:rPr lang="en-US" sz="2400" dirty="0"/>
+                <a:t>Events</a:t>
+              </a:r>
+            </a:p>
+          </p:txBody>
+        </p:sp>
+      </p:grpSp>
+      <p:grpSp>
+        <p:nvGrpSpPr>
+          <p:cNvPr id="19" name="Group 18"/>
+          <p:cNvGrpSpPr/>
+          <p:nvPr/>
+        </p:nvGrpSpPr>
+        <p:grpSpPr>
+          <a:xfrm>
+            <a:off x="645697" y="3822553"/>
+            <a:ext cx="6154975" cy="2019888"/>
+            <a:chOff x="644356" y="1890647"/>
+            <a:chExt cx="6154975" cy="2019888"/>
+          </a:xfrm>
+        </p:grpSpPr>
         <p:sp>
           <p:nvSpPr>
             <p:cNvPr id="9" name="Rounded Rectangle 8"/>
@@ -9364,172 +10478,6 @@
             </a:p>
           </p:txBody>
         </p:sp>
-        <p:sp>
-          <p:nvSpPr>
-            <p:cNvPr id="10" name="Rounded Rectangle 9"/>
-            <p:cNvSpPr/>
-            <p:nvPr/>
-          </p:nvSpPr>
-          <p:spPr>
-            <a:xfrm>
-              <a:off x="9164301" y="3451122"/>
-              <a:ext cx="1495832" cy="904568"/>
-            </a:xfrm>
-            <a:prstGeom prst="roundRect">
-              <a:avLst/>
-            </a:prstGeom>
-          </p:spPr>
-          <p:style>
-            <a:lnRef idx="2">
-              <a:schemeClr val="accent1">
-                <a:shade val="50000"/>
-              </a:schemeClr>
-            </a:lnRef>
-            <a:fillRef idx="1">
-              <a:schemeClr val="accent1"/>
-            </a:fillRef>
-            <a:effectRef idx="0">
-              <a:schemeClr val="accent1"/>
-            </a:effectRef>
-            <a:fontRef idx="minor">
-              <a:schemeClr val="lt1"/>
-            </a:fontRef>
-          </p:style>
-          <p:txBody>
-            <a:bodyPr rtlCol="0" anchor="ctr"/>
-            <a:lstStyle/>
-            <a:p>
-              <a:pPr algn="ctr"/>
-              <a:r>
-                <a:rPr lang="en-US" sz="2400" dirty="0"/>
-                <a:t>Cosine Similarity</a:t>
-              </a:r>
-            </a:p>
-          </p:txBody>
-        </p:sp>
-        <p:sp>
-          <p:nvSpPr>
-            <p:cNvPr id="11" name="Down Arrow 10"/>
-            <p:cNvSpPr/>
-            <p:nvPr/>
-          </p:nvSpPr>
-          <p:spPr>
-            <a:xfrm>
-              <a:off x="9587752" y="2537038"/>
-              <a:ext cx="648929" cy="874754"/>
-            </a:xfrm>
-            <a:prstGeom prst="downArrow">
-              <a:avLst/>
-            </a:prstGeom>
-          </p:spPr>
-          <p:style>
-            <a:lnRef idx="2">
-              <a:schemeClr val="accent1">
-                <a:shade val="50000"/>
-              </a:schemeClr>
-            </a:lnRef>
-            <a:fillRef idx="1">
-              <a:schemeClr val="accent1"/>
-            </a:fillRef>
-            <a:effectRef idx="0">
-              <a:schemeClr val="accent1"/>
-            </a:effectRef>
-            <a:fontRef idx="minor">
-              <a:schemeClr val="lt1"/>
-            </a:fontRef>
-          </p:style>
-          <p:txBody>
-            <a:bodyPr rtlCol="0" anchor="ctr"/>
-            <a:lstStyle/>
-            <a:p>
-              <a:pPr algn="ctr"/>
-              <a:endParaRPr lang="en-US"/>
-            </a:p>
-          </p:txBody>
-        </p:sp>
-        <p:sp>
-          <p:nvSpPr>
-            <p:cNvPr id="12" name="Flowchart: Alternate Process 11"/>
-            <p:cNvSpPr/>
-            <p:nvPr/>
-          </p:nvSpPr>
-          <p:spPr>
-            <a:xfrm>
-              <a:off x="8595345" y="1795698"/>
-              <a:ext cx="2633739" cy="865035"/>
-            </a:xfrm>
-            <a:prstGeom prst="flowChartAlternateProcess">
-              <a:avLst/>
-            </a:prstGeom>
-          </p:spPr>
-          <p:style>
-            <a:lnRef idx="2">
-              <a:schemeClr val="accent1">
-                <a:shade val="50000"/>
-              </a:schemeClr>
-            </a:lnRef>
-            <a:fillRef idx="1">
-              <a:schemeClr val="accent1"/>
-            </a:fillRef>
-            <a:effectRef idx="0">
-              <a:schemeClr val="accent1"/>
-            </a:effectRef>
-            <a:fontRef idx="minor">
-              <a:schemeClr val="lt1"/>
-            </a:fontRef>
-          </p:style>
-          <p:txBody>
-            <a:bodyPr rtlCol="0" anchor="ctr"/>
-            <a:lstStyle/>
-            <a:p>
-              <a:pPr algn="ctr"/>
-              <a:r>
-                <a:rPr lang="en-US" sz="2400" dirty="0"/>
-                <a:t>Incoming Event for particular User</a:t>
-              </a:r>
-            </a:p>
-          </p:txBody>
-        </p:sp>
-        <p:sp>
-          <p:nvSpPr>
-            <p:cNvPr id="13" name="Down Arrow 12"/>
-            <p:cNvSpPr/>
-            <p:nvPr/>
-          </p:nvSpPr>
-          <p:spPr>
-            <a:xfrm>
-              <a:off x="9558255" y="4434348"/>
-              <a:ext cx="707922" cy="936023"/>
-            </a:xfrm>
-            <a:prstGeom prst="downArrow">
-              <a:avLst/>
-            </a:prstGeom>
-          </p:spPr>
-          <p:style>
-            <a:lnRef idx="2">
-              <a:schemeClr val="accent1">
-                <a:shade val="50000"/>
-              </a:schemeClr>
-            </a:lnRef>
-            <a:fillRef idx="1">
-              <a:schemeClr val="accent1"/>
-            </a:fillRef>
-            <a:effectRef idx="0">
-              <a:schemeClr val="accent1"/>
-            </a:effectRef>
-            <a:fontRef idx="minor">
-              <a:schemeClr val="lt1"/>
-            </a:fontRef>
-          </p:style>
-          <p:txBody>
-            <a:bodyPr rtlCol="0" anchor="ctr"/>
-            <a:lstStyle/>
-            <a:p>
-              <a:pPr algn="ctr"/>
-              <a:endParaRPr lang="en-US"/>
-            </a:p>
-          </p:txBody>
-        </p:sp>
         <p:graphicFrame>
           <p:nvGraphicFramePr>
             <p:cNvPr id="14" name="Diagram 13"/>
@@ -9537,7 +10485,7 @@
             <p:nvPr>
               <p:extLst>
                 <p:ext uri="{D42A27DB-BD31-4B8C-83A1-F6EECF244321}">
-                  <p14:modId xmlns:p14="http://schemas.microsoft.com/office/powerpoint/2010/main" val="3429547932"/>
+                  <p14:modId xmlns:p14="http://schemas.microsoft.com/office/powerpoint/2010/main" val="1944075313"/>
                 </p:ext>
               </p:extLst>
             </p:nvPr>
@@ -9548,136 +10496,10 @@
           </p:xfrm>
           <a:graphic>
             <a:graphicData uri="http://schemas.openxmlformats.org/drawingml/2006/diagram">
-              <dgm:relIds xmlns:dgm="http://schemas.openxmlformats.org/drawingml/2006/diagram" xmlns:r="http://schemas.openxmlformats.org/officeDocument/2006/relationships" r:dm="rId7" r:lo="rId8" r:qs="rId9" r:cs="rId10"/>
+              <dgm:relIds xmlns:dgm="http://schemas.openxmlformats.org/drawingml/2006/diagram" xmlns:r="http://schemas.openxmlformats.org/officeDocument/2006/relationships" r:dm="rId8" r:lo="rId9" r:qs="rId10" r:cs="rId11"/>
             </a:graphicData>
           </a:graphic>
         </p:graphicFrame>
-        <p:sp>
-          <p:nvSpPr>
-            <p:cNvPr id="15" name="Rounded Rectangle 14"/>
-            <p:cNvSpPr/>
-            <p:nvPr/>
-          </p:nvSpPr>
-          <p:spPr>
-            <a:xfrm>
-              <a:off x="8525867" y="5449029"/>
-              <a:ext cx="2772697" cy="892777"/>
-            </a:xfrm>
-            <a:prstGeom prst="roundRect">
-              <a:avLst/>
-            </a:prstGeom>
-          </p:spPr>
-          <p:style>
-            <a:lnRef idx="2">
-              <a:schemeClr val="accent1">
-                <a:shade val="50000"/>
-              </a:schemeClr>
-            </a:lnRef>
-            <a:fillRef idx="1">
-              <a:schemeClr val="accent1"/>
-            </a:fillRef>
-            <a:effectRef idx="0">
-              <a:schemeClr val="accent1"/>
-            </a:effectRef>
-            <a:fontRef idx="minor">
-              <a:schemeClr val="lt1"/>
-            </a:fontRef>
-          </p:style>
-          <p:txBody>
-            <a:bodyPr rtlCol="0" anchor="ctr"/>
-            <a:lstStyle/>
-            <a:p>
-              <a:pPr algn="ctr"/>
-              <a:r>
-                <a:rPr lang="en-US" sz="2400" dirty="0"/>
-                <a:t>Recommendation Result</a:t>
-              </a:r>
-            </a:p>
-          </p:txBody>
-        </p:sp>
-        <p:sp>
-          <p:nvSpPr>
-            <p:cNvPr id="16" name="Right Arrow 15"/>
-            <p:cNvSpPr/>
-            <p:nvPr/>
-          </p:nvSpPr>
-          <p:spPr>
-            <a:xfrm>
-              <a:off x="8125822" y="3533779"/>
-              <a:ext cx="989320" cy="736718"/>
-            </a:xfrm>
-            <a:prstGeom prst="rightArrow">
-              <a:avLst/>
-            </a:prstGeom>
-          </p:spPr>
-          <p:style>
-            <a:lnRef idx="2">
-              <a:schemeClr val="accent1">
-                <a:shade val="50000"/>
-              </a:schemeClr>
-            </a:lnRef>
-            <a:fillRef idx="1">
-              <a:schemeClr val="accent1"/>
-            </a:fillRef>
-            <a:effectRef idx="0">
-              <a:schemeClr val="accent1"/>
-            </a:effectRef>
-            <a:fontRef idx="minor">
-              <a:schemeClr val="lt1"/>
-            </a:fontRef>
-          </p:style>
-          <p:txBody>
-            <a:bodyPr rtlCol="0" anchor="ctr"/>
-            <a:lstStyle/>
-            <a:p>
-              <a:pPr algn="ctr"/>
-              <a:endParaRPr lang="en-US"/>
-            </a:p>
-          </p:txBody>
-        </p:sp>
-        <p:sp>
-          <p:nvSpPr>
-            <p:cNvPr id="17" name="Rounded Rectangle 16"/>
-            <p:cNvSpPr/>
-            <p:nvPr/>
-          </p:nvSpPr>
-          <p:spPr>
-            <a:xfrm>
-              <a:off x="644356" y="3893507"/>
-              <a:ext cx="1102299" cy="1643375"/>
-            </a:xfrm>
-            <a:prstGeom prst="roundRect">
-              <a:avLst/>
-            </a:prstGeom>
-          </p:spPr>
-          <p:style>
-            <a:lnRef idx="2">
-              <a:schemeClr val="accent1">
-                <a:shade val="50000"/>
-              </a:schemeClr>
-            </a:lnRef>
-            <a:fillRef idx="1">
-              <a:schemeClr val="accent1"/>
-            </a:fillRef>
-            <a:effectRef idx="0">
-              <a:schemeClr val="accent1"/>
-            </a:effectRef>
-            <a:fontRef idx="minor">
-              <a:schemeClr val="lt1"/>
-            </a:fontRef>
-          </p:style>
-          <p:txBody>
-            <a:bodyPr rtlCol="0" anchor="ctr"/>
-            <a:lstStyle/>
-            <a:p>
-              <a:pPr algn="ctr"/>
-              <a:r>
-                <a:rPr lang="en-US" sz="2400" dirty="0"/>
-                <a:t>Events</a:t>
-              </a:r>
-            </a:p>
-          </p:txBody>
-        </p:sp>
         <p:sp>
           <p:nvSpPr>
             <p:cNvPr id="18" name="Rounded Rectangle 17"/>
@@ -9729,6 +10551,253 @@
           </p:txBody>
         </p:sp>
       </p:grpSp>
+      <p:sp>
+        <p:nvSpPr>
+          <p:cNvPr id="10" name="Rounded Rectangle 9"/>
+          <p:cNvSpPr/>
+          <p:nvPr/>
+        </p:nvSpPr>
+        <p:spPr>
+          <a:xfrm>
+            <a:off x="9164301" y="3451122"/>
+            <a:ext cx="1495832" cy="904568"/>
+          </a:xfrm>
+          <a:prstGeom prst="roundRect">
+            <a:avLst/>
+          </a:prstGeom>
+        </p:spPr>
+        <p:style>
+          <a:lnRef idx="2">
+            <a:schemeClr val="accent1">
+              <a:shade val="50000"/>
+            </a:schemeClr>
+          </a:lnRef>
+          <a:fillRef idx="1">
+            <a:schemeClr val="accent1"/>
+          </a:fillRef>
+          <a:effectRef idx="0">
+            <a:schemeClr val="accent1"/>
+          </a:effectRef>
+          <a:fontRef idx="minor">
+            <a:schemeClr val="lt1"/>
+          </a:fontRef>
+        </p:style>
+        <p:txBody>
+          <a:bodyPr rtlCol="0" anchor="ctr"/>
+          <a:lstStyle/>
+          <a:p>
+            <a:pPr algn="ctr"/>
+            <a:r>
+              <a:rPr lang="en-US" sz="2400" dirty="0"/>
+              <a:t>Cosine Similarity</a:t>
+            </a:r>
+          </a:p>
+        </p:txBody>
+      </p:sp>
+      <p:sp>
+        <p:nvSpPr>
+          <p:cNvPr id="11" name="Down Arrow 10"/>
+          <p:cNvSpPr/>
+          <p:nvPr/>
+        </p:nvSpPr>
+        <p:spPr>
+          <a:xfrm>
+            <a:off x="9587752" y="2537038"/>
+            <a:ext cx="648929" cy="874754"/>
+          </a:xfrm>
+          <a:prstGeom prst="downArrow">
+            <a:avLst/>
+          </a:prstGeom>
+        </p:spPr>
+        <p:style>
+          <a:lnRef idx="2">
+            <a:schemeClr val="accent1">
+              <a:shade val="50000"/>
+            </a:schemeClr>
+          </a:lnRef>
+          <a:fillRef idx="1">
+            <a:schemeClr val="accent1"/>
+          </a:fillRef>
+          <a:effectRef idx="0">
+            <a:schemeClr val="accent1"/>
+          </a:effectRef>
+          <a:fontRef idx="minor">
+            <a:schemeClr val="lt1"/>
+          </a:fontRef>
+        </p:style>
+        <p:txBody>
+          <a:bodyPr rtlCol="0" anchor="ctr"/>
+          <a:lstStyle/>
+          <a:p>
+            <a:pPr algn="ctr"/>
+            <a:endParaRPr lang="en-US"/>
+          </a:p>
+        </p:txBody>
+      </p:sp>
+      <p:sp>
+        <p:nvSpPr>
+          <p:cNvPr id="13" name="Down Arrow 12"/>
+          <p:cNvSpPr/>
+          <p:nvPr/>
+        </p:nvSpPr>
+        <p:spPr>
+          <a:xfrm>
+            <a:off x="9558255" y="4434348"/>
+            <a:ext cx="707922" cy="936023"/>
+          </a:xfrm>
+          <a:prstGeom prst="downArrow">
+            <a:avLst/>
+          </a:prstGeom>
+        </p:spPr>
+        <p:style>
+          <a:lnRef idx="2">
+            <a:schemeClr val="accent1">
+              <a:shade val="50000"/>
+            </a:schemeClr>
+          </a:lnRef>
+          <a:fillRef idx="1">
+            <a:schemeClr val="accent1"/>
+          </a:fillRef>
+          <a:effectRef idx="0">
+            <a:schemeClr val="accent1"/>
+          </a:effectRef>
+          <a:fontRef idx="minor">
+            <a:schemeClr val="lt1"/>
+          </a:fontRef>
+        </p:style>
+        <p:txBody>
+          <a:bodyPr rtlCol="0" anchor="ctr"/>
+          <a:lstStyle/>
+          <a:p>
+            <a:pPr algn="ctr"/>
+            <a:endParaRPr lang="en-US"/>
+          </a:p>
+        </p:txBody>
+      </p:sp>
+      <p:sp>
+        <p:nvSpPr>
+          <p:cNvPr id="16" name="Right Arrow 15"/>
+          <p:cNvSpPr/>
+          <p:nvPr/>
+        </p:nvSpPr>
+        <p:spPr>
+          <a:xfrm>
+            <a:off x="8125822" y="3533779"/>
+            <a:ext cx="989320" cy="736718"/>
+          </a:xfrm>
+          <a:prstGeom prst="rightArrow">
+            <a:avLst/>
+          </a:prstGeom>
+        </p:spPr>
+        <p:style>
+          <a:lnRef idx="2">
+            <a:schemeClr val="accent1">
+              <a:shade val="50000"/>
+            </a:schemeClr>
+          </a:lnRef>
+          <a:fillRef idx="1">
+            <a:schemeClr val="accent1"/>
+          </a:fillRef>
+          <a:effectRef idx="0">
+            <a:schemeClr val="accent1"/>
+          </a:effectRef>
+          <a:fontRef idx="minor">
+            <a:schemeClr val="lt1"/>
+          </a:fontRef>
+        </p:style>
+        <p:txBody>
+          <a:bodyPr rtlCol="0" anchor="ctr"/>
+          <a:lstStyle/>
+          <a:p>
+            <a:pPr algn="ctr"/>
+            <a:endParaRPr lang="en-US"/>
+          </a:p>
+        </p:txBody>
+      </p:sp>
+      <p:pic>
+        <p:nvPicPr>
+          <p:cNvPr id="22" name="Picture 16" descr="https://d2v9y0dukr6mq2.cloudfront.net/video/thumbnail/QwIr88a/snow-hiker-hiking-adventure-mountain-travel-outdoor-trekking-extreme-sport-cold-active-ice-winter-landscape-sky-backpacker-nature-people-trek-mountaineering-hike-climbing-high-summit-activity-climber-tourist-altitude-man_4yxzrjrr__S0000.jpg"/>
+          <p:cNvPicPr>
+            <a:picLocks noChangeAspect="1" noChangeArrowheads="1"/>
+          </p:cNvPicPr>
+          <p:nvPr/>
+        </p:nvPicPr>
+        <p:blipFill>
+          <a:blip r:embed="rId13">
+            <a:extLst>
+              <a:ext uri="{28A0092B-C50C-407E-A947-70E740481C1C}">
+                <a14:useLocalDpi xmlns:a14="http://schemas.microsoft.com/office/drawing/2010/main" val="0"/>
+              </a:ext>
+            </a:extLst>
+          </a:blip>
+          <a:srcRect/>
+          <a:stretch>
+            <a:fillRect/>
+          </a:stretch>
+        </p:blipFill>
+        <p:spPr bwMode="auto">
+          <a:xfrm>
+            <a:off x="8680742" y="1271684"/>
+            <a:ext cx="2345543" cy="1283494"/>
+          </a:xfrm>
+          <a:prstGeom prst="rect">
+            <a:avLst/>
+          </a:prstGeom>
+          <a:noFill/>
+          <a:extLst>
+            <a:ext uri="{909E8E84-426E-40DD-AFC4-6F175D3DCCD1}">
+              <a14:hiddenFill xmlns:a14="http://schemas.microsoft.com/office/drawing/2010/main">
+                <a:solidFill>
+                  <a:srgbClr val="FFFFFF"/>
+                </a:solidFill>
+              </a14:hiddenFill>
+            </a:ext>
+          </a:extLst>
+        </p:spPr>
+      </p:pic>
+      <p:sp>
+        <p:nvSpPr>
+          <p:cNvPr id="24" name="Multiply 23"/>
+          <p:cNvSpPr/>
+          <p:nvPr/>
+        </p:nvSpPr>
+        <p:spPr>
+          <a:xfrm>
+            <a:off x="8792887" y="4902359"/>
+            <a:ext cx="2238658" cy="1811825"/>
+          </a:xfrm>
+          <a:prstGeom prst="mathMultiply">
+            <a:avLst/>
+          </a:prstGeom>
+          <a:solidFill>
+            <a:srgbClr val="C00000"/>
+          </a:solidFill>
+        </p:spPr>
+        <p:style>
+          <a:lnRef idx="2">
+            <a:schemeClr val="accent1">
+              <a:shade val="50000"/>
+            </a:schemeClr>
+          </a:lnRef>
+          <a:fillRef idx="1">
+            <a:schemeClr val="accent1"/>
+          </a:fillRef>
+          <a:effectRef idx="0">
+            <a:schemeClr val="accent1"/>
+          </a:effectRef>
+          <a:fontRef idx="minor">
+            <a:schemeClr val="lt1"/>
+          </a:fontRef>
+        </p:style>
+        <p:txBody>
+          <a:bodyPr rtlCol="0" anchor="ctr"/>
+          <a:lstStyle/>
+          <a:p>
+            <a:pPr algn="ctr"/>
+            <a:endParaRPr lang="en-US"/>
+          </a:p>
+        </p:txBody>
+      </p:sp>
     </p:spTree>
     <p:extLst>
       <p:ext uri="{BB962C8B-B14F-4D97-AF65-F5344CB8AC3E}">
@@ -9739,231 +10808,385 @@
   <p:clrMapOvr>
     <a:masterClrMapping/>
   </p:clrMapOvr>
-</p:sld>
-</file>
-
-<file path=ppt/slides/slide6.xml><?xml version="1.0" encoding="utf-8"?>
-<p:sld xmlns:a="http://schemas.openxmlformats.org/drawingml/2006/main" xmlns:r="http://schemas.openxmlformats.org/officeDocument/2006/relationships" xmlns:p="http://schemas.openxmlformats.org/presentationml/2006/main">
-  <p:cSld>
-    <p:spTree>
-      <p:nvGrpSpPr>
-        <p:cNvPr id="1" name=""/>
-        <p:cNvGrpSpPr/>
-        <p:nvPr/>
-      </p:nvGrpSpPr>
-      <p:grpSpPr>
-        <a:xfrm>
-          <a:off x="0" y="0"/>
-          <a:ext cx="0" cy="0"/>
-          <a:chOff x="0" y="0"/>
-          <a:chExt cx="0" cy="0"/>
-        </a:xfrm>
-      </p:grpSpPr>
-      <p:sp>
-        <p:nvSpPr>
-          <p:cNvPr id="2" name="Title 1"/>
-          <p:cNvSpPr>
-            <a:spLocks noGrp="1"/>
-          </p:cNvSpPr>
-          <p:nvPr>
-            <p:ph type="title"/>
-          </p:nvPr>
-        </p:nvSpPr>
-        <p:spPr/>
-        <p:txBody>
-          <a:bodyPr/>
-          <a:lstStyle/>
-          <a:p>
-            <a:r>
-              <a:rPr lang="en-US" dirty="0">
-                <a:solidFill>
-                  <a:schemeClr val="bg1"/>
-                </a:solidFill>
-              </a:rPr>
-              <a:t>Challenges</a:t>
-            </a:r>
-          </a:p>
-        </p:txBody>
-      </p:sp>
-      <p:sp>
-        <p:nvSpPr>
-          <p:cNvPr id="3" name="Content Placeholder 2"/>
-          <p:cNvSpPr>
-            <a:spLocks noGrp="1"/>
-          </p:cNvSpPr>
-          <p:nvPr>
-            <p:ph idx="1"/>
-          </p:nvPr>
-        </p:nvSpPr>
-        <p:spPr/>
-        <p:txBody>
-          <a:bodyPr/>
-          <a:lstStyle/>
-          <a:p>
-            <a:r>
-              <a:rPr lang="en-US" dirty="0">
-                <a:solidFill>
-                  <a:schemeClr val="bg1"/>
-                </a:solidFill>
-              </a:rPr>
-              <a:t>Too many features/attributes </a:t>
-            </a:r>
-          </a:p>
-          <a:p>
-            <a:r>
-              <a:rPr lang="en-US" dirty="0">
-                <a:solidFill>
-                  <a:schemeClr val="bg1"/>
-                </a:solidFill>
-              </a:rPr>
-              <a:t>Bulk Loading into </a:t>
-            </a:r>
-            <a:r>
-              <a:rPr lang="en-US" dirty="0" err="1">
-                <a:solidFill>
-                  <a:schemeClr val="bg1"/>
-                </a:solidFill>
-              </a:rPr>
-              <a:t>Hbase</a:t>
-            </a:r>
-            <a:endParaRPr lang="en-US" dirty="0">
-              <a:solidFill>
-                <a:schemeClr val="bg1"/>
-              </a:solidFill>
-            </a:endParaRPr>
-          </a:p>
-          <a:p>
-            <a:r>
-              <a:rPr lang="en-US" dirty="0">
-                <a:solidFill>
-                  <a:schemeClr val="bg1"/>
-                </a:solidFill>
-              </a:rPr>
-              <a:t>Out of RAM – GB of data</a:t>
-            </a:r>
-          </a:p>
-          <a:p>
-            <a:r>
-              <a:rPr lang="en-US" dirty="0">
-                <a:solidFill>
-                  <a:schemeClr val="bg1"/>
-                </a:solidFill>
-              </a:rPr>
-              <a:t>Excessive Logging</a:t>
-            </a:r>
-          </a:p>
-          <a:p>
-            <a:endParaRPr lang="en-US" dirty="0">
-              <a:solidFill>
-                <a:schemeClr val="bg1"/>
-              </a:solidFill>
-            </a:endParaRPr>
-          </a:p>
-          <a:p>
-            <a:endParaRPr lang="en-US" dirty="0">
-              <a:solidFill>
-                <a:schemeClr val="bg1"/>
-              </a:solidFill>
-            </a:endParaRPr>
-          </a:p>
-          <a:p>
-            <a:endParaRPr lang="en-US" dirty="0">
-              <a:solidFill>
-                <a:schemeClr val="bg1"/>
-              </a:solidFill>
-            </a:endParaRPr>
-          </a:p>
-        </p:txBody>
-      </p:sp>
-    </p:spTree>
-    <p:extLst>
-      <p:ext uri="{BB962C8B-B14F-4D97-AF65-F5344CB8AC3E}">
-        <p14:creationId xmlns:p14="http://schemas.microsoft.com/office/powerpoint/2010/main" val="3151929899"/>
-      </p:ext>
-    </p:extLst>
-  </p:cSld>
-  <p:clrMapOvr>
-    <a:masterClrMapping/>
-  </p:clrMapOvr>
-</p:sld>
-</file>
-
-<file path=ppt/slides/slide7.xml><?xml version="1.0" encoding="utf-8"?>
-<p:sld xmlns:a="http://schemas.openxmlformats.org/drawingml/2006/main" xmlns:r="http://schemas.openxmlformats.org/officeDocument/2006/relationships" xmlns:p="http://schemas.openxmlformats.org/presentationml/2006/main">
-  <p:cSld>
-    <p:spTree>
-      <p:nvGrpSpPr>
-        <p:cNvPr id="1" name=""/>
-        <p:cNvGrpSpPr/>
-        <p:nvPr/>
-      </p:nvGrpSpPr>
-      <p:grpSpPr>
-        <a:xfrm>
-          <a:off x="0" y="0"/>
-          <a:ext cx="0" cy="0"/>
-          <a:chOff x="0" y="0"/>
-          <a:chExt cx="0" cy="0"/>
-        </a:xfrm>
-      </p:grpSpPr>
-      <p:sp>
-        <p:nvSpPr>
-          <p:cNvPr id="2" name="Title 1"/>
-          <p:cNvSpPr>
-            <a:spLocks noGrp="1"/>
-          </p:cNvSpPr>
-          <p:nvPr>
-            <p:ph type="title"/>
-          </p:nvPr>
-        </p:nvSpPr>
-        <p:spPr/>
-        <p:txBody>
-          <a:bodyPr/>
-          <a:lstStyle/>
-          <a:p>
-            <a:r>
-              <a:rPr lang="en-US" dirty="0">
-                <a:solidFill>
-                  <a:schemeClr val="bg1"/>
-                </a:solidFill>
-              </a:rPr>
-              <a:t>Demo  &amp; Results</a:t>
-            </a:r>
-          </a:p>
-        </p:txBody>
-      </p:sp>
-      <p:sp>
-        <p:nvSpPr>
-          <p:cNvPr id="3" name="Content Placeholder 2"/>
-          <p:cNvSpPr>
-            <a:spLocks noGrp="1"/>
-          </p:cNvSpPr>
-          <p:nvPr>
-            <p:ph idx="1"/>
-          </p:nvPr>
-        </p:nvSpPr>
-        <p:spPr/>
-        <p:txBody>
-          <a:bodyPr/>
-          <a:lstStyle/>
-          <a:p>
-            <a:endParaRPr lang="en-US" dirty="0">
-              <a:solidFill>
-                <a:schemeClr val="bg1"/>
-              </a:solidFill>
-            </a:endParaRPr>
-          </a:p>
-        </p:txBody>
-      </p:sp>
-    </p:spTree>
-    <p:extLst>
-      <p:ext uri="{BB962C8B-B14F-4D97-AF65-F5344CB8AC3E}">
-        <p14:creationId xmlns:p14="http://schemas.microsoft.com/office/powerpoint/2010/main" val="2327261966"/>
-      </p:ext>
-    </p:extLst>
-  </p:cSld>
-  <p:clrMapOvr>
-    <a:masterClrMapping/>
-  </p:clrMapOvr>
+  <mc:AlternateContent xmlns:mc="http://schemas.openxmlformats.org/markup-compatibility/2006">
+    <mc:Choice xmlns:p14="http://schemas.microsoft.com/office/powerpoint/2010/main" Requires="p14">
+      <p:transition p14:dur="0"/>
+    </mc:Choice>
+    <mc:Fallback>
+      <p:transition/>
+    </mc:Fallback>
+  </mc:AlternateContent>
+  <p:timing>
+    <p:tnLst>
+      <p:par>
+        <p:cTn id="1" dur="indefinite" restart="never" nodeType="tmRoot">
+          <p:childTnLst>
+            <p:seq concurrent="1" nextAc="seek">
+              <p:cTn id="2" dur="indefinite" nodeType="mainSeq">
+                <p:childTnLst>
+                  <p:par>
+                    <p:cTn id="3" fill="hold">
+                      <p:stCondLst>
+                        <p:cond delay="indefinite"/>
+                      </p:stCondLst>
+                      <p:childTnLst>
+                        <p:par>
+                          <p:cTn id="4" fill="hold">
+                            <p:stCondLst>
+                              <p:cond delay="0"/>
+                            </p:stCondLst>
+                            <p:childTnLst>
+                              <p:par>
+                                <p:cTn id="5" presetID="1" presetClass="entr" presetSubtype="0" fill="hold" nodeType="clickEffect">
+                                  <p:stCondLst>
+                                    <p:cond delay="0"/>
+                                  </p:stCondLst>
+                                  <p:childTnLst>
+                                    <p:set>
+                                      <p:cBhvr>
+                                        <p:cTn id="6" dur="1" fill="hold">
+                                          <p:stCondLst>
+                                            <p:cond delay="0"/>
+                                          </p:stCondLst>
+                                        </p:cTn>
+                                        <p:tgtEl>
+                                          <p:spTgt spid="3"/>
+                                        </p:tgtEl>
+                                        <p:attrNameLst>
+                                          <p:attrName>style.visibility</p:attrName>
+                                        </p:attrNameLst>
+                                      </p:cBhvr>
+                                      <p:to>
+                                        <p:strVal val="visible"/>
+                                      </p:to>
+                                    </p:set>
+                                  </p:childTnLst>
+                                </p:cTn>
+                              </p:par>
+                              <p:par>
+                                <p:cTn id="7" presetID="1" presetClass="entr" presetSubtype="0" fill="hold" grpId="0" nodeType="withEffect">
+                                  <p:stCondLst>
+                                    <p:cond delay="0"/>
+                                  </p:stCondLst>
+                                  <p:childTnLst>
+                                    <p:set>
+                                      <p:cBhvr>
+                                        <p:cTn id="8" dur="1" fill="hold">
+                                          <p:stCondLst>
+                                            <p:cond delay="0"/>
+                                          </p:stCondLst>
+                                        </p:cTn>
+                                        <p:tgtEl>
+                                          <p:spTgt spid="5"/>
+                                        </p:tgtEl>
+                                        <p:attrNameLst>
+                                          <p:attrName>style.visibility</p:attrName>
+                                        </p:attrNameLst>
+                                      </p:cBhvr>
+                                      <p:to>
+                                        <p:strVal val="visible"/>
+                                      </p:to>
+                                    </p:set>
+                                  </p:childTnLst>
+                                </p:cTn>
+                              </p:par>
+                            </p:childTnLst>
+                          </p:cTn>
+                        </p:par>
+                      </p:childTnLst>
+                    </p:cTn>
+                  </p:par>
+                  <p:par>
+                    <p:cTn id="9" fill="hold">
+                      <p:stCondLst>
+                        <p:cond delay="indefinite"/>
+                      </p:stCondLst>
+                      <p:childTnLst>
+                        <p:par>
+                          <p:cTn id="10" fill="hold">
+                            <p:stCondLst>
+                              <p:cond delay="0"/>
+                            </p:stCondLst>
+                            <p:childTnLst>
+                              <p:par>
+                                <p:cTn id="11" presetID="1" presetClass="entr" presetSubtype="0" fill="hold" nodeType="clickEffect">
+                                  <p:stCondLst>
+                                    <p:cond delay="0"/>
+                                  </p:stCondLst>
+                                  <p:childTnLst>
+                                    <p:set>
+                                      <p:cBhvr>
+                                        <p:cTn id="12" dur="1" fill="hold">
+                                          <p:stCondLst>
+                                            <p:cond delay="0"/>
+                                          </p:stCondLst>
+                                        </p:cTn>
+                                        <p:tgtEl>
+                                          <p:spTgt spid="19"/>
+                                        </p:tgtEl>
+                                        <p:attrNameLst>
+                                          <p:attrName>style.visibility</p:attrName>
+                                        </p:attrNameLst>
+                                      </p:cBhvr>
+                                      <p:to>
+                                        <p:strVal val="visible"/>
+                                      </p:to>
+                                    </p:set>
+                                  </p:childTnLst>
+                                </p:cTn>
+                              </p:par>
+                            </p:childTnLst>
+                          </p:cTn>
+                        </p:par>
+                      </p:childTnLst>
+                    </p:cTn>
+                  </p:par>
+                  <p:par>
+                    <p:cTn id="13" fill="hold">
+                      <p:stCondLst>
+                        <p:cond delay="indefinite"/>
+                      </p:stCondLst>
+                      <p:childTnLst>
+                        <p:par>
+                          <p:cTn id="14" fill="hold">
+                            <p:stCondLst>
+                              <p:cond delay="0"/>
+                            </p:stCondLst>
+                            <p:childTnLst>
+                              <p:par>
+                                <p:cTn id="15" presetID="1" presetClass="entr" presetSubtype="0" fill="hold" nodeType="clickEffect">
+                                  <p:stCondLst>
+                                    <p:cond delay="0"/>
+                                  </p:stCondLst>
+                                  <p:childTnLst>
+                                    <p:set>
+                                      <p:cBhvr>
+                                        <p:cTn id="16" dur="1" fill="hold">
+                                          <p:stCondLst>
+                                            <p:cond delay="0"/>
+                                          </p:stCondLst>
+                                        </p:cTn>
+                                        <p:tgtEl>
+                                          <p:spTgt spid="22"/>
+                                        </p:tgtEl>
+                                        <p:attrNameLst>
+                                          <p:attrName>style.visibility</p:attrName>
+                                        </p:attrNameLst>
+                                      </p:cBhvr>
+                                      <p:to>
+                                        <p:strVal val="visible"/>
+                                      </p:to>
+                                    </p:set>
+                                  </p:childTnLst>
+                                </p:cTn>
+                              </p:par>
+                            </p:childTnLst>
+                          </p:cTn>
+                        </p:par>
+                      </p:childTnLst>
+                    </p:cTn>
+                  </p:par>
+                  <p:par>
+                    <p:cTn id="17" fill="hold">
+                      <p:stCondLst>
+                        <p:cond delay="indefinite"/>
+                      </p:stCondLst>
+                      <p:childTnLst>
+                        <p:par>
+                          <p:cTn id="18" fill="hold">
+                            <p:stCondLst>
+                              <p:cond delay="0"/>
+                            </p:stCondLst>
+                            <p:childTnLst>
+                              <p:par>
+                                <p:cTn id="19" presetID="1" presetClass="entr" presetSubtype="0" fill="hold" grpId="0" nodeType="clickEffect">
+                                  <p:stCondLst>
+                                    <p:cond delay="0"/>
+                                  </p:stCondLst>
+                                  <p:childTnLst>
+                                    <p:set>
+                                      <p:cBhvr>
+                                        <p:cTn id="20" dur="1" fill="hold">
+                                          <p:stCondLst>
+                                            <p:cond delay="0"/>
+                                          </p:stCondLst>
+                                        </p:cTn>
+                                        <p:tgtEl>
+                                          <p:spTgt spid="11"/>
+                                        </p:tgtEl>
+                                        <p:attrNameLst>
+                                          <p:attrName>style.visibility</p:attrName>
+                                        </p:attrNameLst>
+                                      </p:cBhvr>
+                                      <p:to>
+                                        <p:strVal val="visible"/>
+                                      </p:to>
+                                    </p:set>
+                                  </p:childTnLst>
+                                </p:cTn>
+                              </p:par>
+                              <p:par>
+                                <p:cTn id="21" presetID="1" presetClass="entr" presetSubtype="0" fill="hold" grpId="0" nodeType="withEffect">
+                                  <p:stCondLst>
+                                    <p:cond delay="0"/>
+                                  </p:stCondLst>
+                                  <p:childTnLst>
+                                    <p:set>
+                                      <p:cBhvr>
+                                        <p:cTn id="22" dur="1" fill="hold">
+                                          <p:stCondLst>
+                                            <p:cond delay="0"/>
+                                          </p:stCondLst>
+                                        </p:cTn>
+                                        <p:tgtEl>
+                                          <p:spTgt spid="10"/>
+                                        </p:tgtEl>
+                                        <p:attrNameLst>
+                                          <p:attrName>style.visibility</p:attrName>
+                                        </p:attrNameLst>
+                                      </p:cBhvr>
+                                      <p:to>
+                                        <p:strVal val="visible"/>
+                                      </p:to>
+                                    </p:set>
+                                  </p:childTnLst>
+                                </p:cTn>
+                              </p:par>
+                              <p:par>
+                                <p:cTn id="23" presetID="1" presetClass="entr" presetSubtype="0" fill="hold" grpId="0" nodeType="withEffect">
+                                  <p:stCondLst>
+                                    <p:cond delay="0"/>
+                                  </p:stCondLst>
+                                  <p:childTnLst>
+                                    <p:set>
+                                      <p:cBhvr>
+                                        <p:cTn id="24" dur="1" fill="hold">
+                                          <p:stCondLst>
+                                            <p:cond delay="0"/>
+                                          </p:stCondLst>
+                                        </p:cTn>
+                                        <p:tgtEl>
+                                          <p:spTgt spid="16"/>
+                                        </p:tgtEl>
+                                        <p:attrNameLst>
+                                          <p:attrName>style.visibility</p:attrName>
+                                        </p:attrNameLst>
+                                      </p:cBhvr>
+                                      <p:to>
+                                        <p:strVal val="visible"/>
+                                      </p:to>
+                                    </p:set>
+                                  </p:childTnLst>
+                                </p:cTn>
+                              </p:par>
+                            </p:childTnLst>
+                          </p:cTn>
+                        </p:par>
+                      </p:childTnLst>
+                    </p:cTn>
+                  </p:par>
+                  <p:par>
+                    <p:cTn id="25" fill="hold">
+                      <p:stCondLst>
+                        <p:cond delay="indefinite"/>
+                      </p:stCondLst>
+                      <p:childTnLst>
+                        <p:par>
+                          <p:cTn id="26" fill="hold">
+                            <p:stCondLst>
+                              <p:cond delay="0"/>
+                            </p:stCondLst>
+                            <p:childTnLst>
+                              <p:par>
+                                <p:cTn id="27" presetID="1" presetClass="entr" presetSubtype="0" fill="hold" grpId="0" nodeType="clickEffect">
+                                  <p:stCondLst>
+                                    <p:cond delay="0"/>
+                                  </p:stCondLst>
+                                  <p:childTnLst>
+                                    <p:set>
+                                      <p:cBhvr>
+                                        <p:cTn id="28" dur="1" fill="hold">
+                                          <p:stCondLst>
+                                            <p:cond delay="0"/>
+                                          </p:stCondLst>
+                                        </p:cTn>
+                                        <p:tgtEl>
+                                          <p:spTgt spid="13"/>
+                                        </p:tgtEl>
+                                        <p:attrNameLst>
+                                          <p:attrName>style.visibility</p:attrName>
+                                        </p:attrNameLst>
+                                      </p:cBhvr>
+                                      <p:to>
+                                        <p:strVal val="visible"/>
+                                      </p:to>
+                                    </p:set>
+                                  </p:childTnLst>
+                                </p:cTn>
+                              </p:par>
+                              <p:par>
+                                <p:cTn id="29" presetID="1" presetClass="entr" presetSubtype="0" fill="hold" grpId="0" nodeType="withEffect">
+                                  <p:stCondLst>
+                                    <p:cond delay="0"/>
+                                  </p:stCondLst>
+                                  <p:childTnLst>
+                                    <p:set>
+                                      <p:cBhvr>
+                                        <p:cTn id="30" dur="1" fill="hold">
+                                          <p:stCondLst>
+                                            <p:cond delay="0"/>
+                                          </p:stCondLst>
+                                        </p:cTn>
+                                        <p:tgtEl>
+                                          <p:spTgt spid="24"/>
+                                        </p:tgtEl>
+                                        <p:attrNameLst>
+                                          <p:attrName>style.visibility</p:attrName>
+                                        </p:attrNameLst>
+                                      </p:cBhvr>
+                                      <p:to>
+                                        <p:strVal val="visible"/>
+                                      </p:to>
+                                    </p:set>
+                                  </p:childTnLst>
+                                </p:cTn>
+                              </p:par>
+                            </p:childTnLst>
+                          </p:cTn>
+                        </p:par>
+                      </p:childTnLst>
+                    </p:cTn>
+                  </p:par>
+                </p:childTnLst>
+              </p:cTn>
+              <p:prevCondLst>
+                <p:cond evt="onPrev" delay="0">
+                  <p:tgtEl>
+                    <p:sldTgt/>
+                  </p:tgtEl>
+                </p:cond>
+              </p:prevCondLst>
+              <p:nextCondLst>
+                <p:cond evt="onNext" delay="0">
+                  <p:tgtEl>
+                    <p:sldTgt/>
+                  </p:tgtEl>
+                </p:cond>
+              </p:nextCondLst>
+            </p:seq>
+          </p:childTnLst>
+        </p:cTn>
+      </p:par>
+    </p:tnLst>
+    <p:bldLst>
+      <p:bldP spid="5" grpId="0" animBg="1"/>
+      <p:bldP spid="10" grpId="0" animBg="1"/>
+      <p:bldP spid="11" grpId="0" animBg="1"/>
+      <p:bldP spid="13" grpId="0" animBg="1"/>
+      <p:bldP spid="16" grpId="0" animBg="1"/>
+      <p:bldP spid="24" grpId="0" animBg="1"/>
+    </p:bldLst>
+  </p:timing>
 </p:sld>
 </file>
 
@@ -10005,7 +11228,7 @@
                   <a:schemeClr val="bg1"/>
                 </a:solidFill>
               </a:rPr>
-              <a:t>Summary</a:t>
+              <a:t>Challenges</a:t>
             </a:r>
           </a:p>
         </p:txBody>
@@ -10025,24 +11248,144 @@
           <a:bodyPr/>
           <a:lstStyle/>
           <a:p>
+            <a:r>
+              <a:rPr lang="en-US" dirty="0">
+                <a:solidFill>
+                  <a:schemeClr val="bg1"/>
+                </a:solidFill>
+              </a:rPr>
+              <a:t>Too many features/attributes </a:t>
+            </a:r>
+            <a:endParaRPr lang="en-US" dirty="0" smtClean="0">
+              <a:solidFill>
+                <a:schemeClr val="bg1"/>
+              </a:solidFill>
+            </a:endParaRPr>
+          </a:p>
+          <a:p>
+            <a:r>
+              <a:rPr lang="en-US" dirty="0">
+                <a:solidFill>
+                  <a:schemeClr val="bg1"/>
+                </a:solidFill>
+              </a:rPr>
+              <a:t>Environment to </a:t>
+            </a:r>
+            <a:r>
+              <a:rPr lang="en-US" dirty="0" smtClean="0">
+                <a:solidFill>
+                  <a:schemeClr val="bg1"/>
+                </a:solidFill>
+              </a:rPr>
+              <a:t>run jobs</a:t>
+            </a:r>
             <a:endParaRPr lang="en-US" dirty="0">
               <a:solidFill>
                 <a:schemeClr val="bg1"/>
               </a:solidFill>
             </a:endParaRPr>
           </a:p>
+          <a:p>
+            <a:r>
+              <a:rPr lang="en-US" dirty="0">
+                <a:solidFill>
+                  <a:schemeClr val="bg1"/>
+                </a:solidFill>
+              </a:rPr>
+              <a:t>Bulk Loading into </a:t>
+            </a:r>
+            <a:r>
+              <a:rPr lang="en-US" dirty="0" err="1" smtClean="0">
+                <a:solidFill>
+                  <a:schemeClr val="bg1"/>
+                </a:solidFill>
+              </a:rPr>
+              <a:t>HBase</a:t>
+            </a:r>
+            <a:endParaRPr lang="en-US" dirty="0">
+              <a:solidFill>
+                <a:schemeClr val="bg1"/>
+              </a:solidFill>
+            </a:endParaRPr>
+          </a:p>
+          <a:p>
+            <a:r>
+              <a:rPr lang="en-US" dirty="0">
+                <a:solidFill>
+                  <a:schemeClr val="bg1"/>
+                </a:solidFill>
+              </a:rPr>
+              <a:t>Out of RAM – GB of data</a:t>
+            </a:r>
+          </a:p>
+          <a:p>
+            <a:r>
+              <a:rPr lang="en-US" dirty="0">
+                <a:solidFill>
+                  <a:schemeClr val="bg1"/>
+                </a:solidFill>
+              </a:rPr>
+              <a:t>Excessive </a:t>
+            </a:r>
+            <a:r>
+              <a:rPr lang="en-US" dirty="0" smtClean="0">
+                <a:solidFill>
+                  <a:schemeClr val="bg1"/>
+                </a:solidFill>
+              </a:rPr>
+              <a:t>Logging</a:t>
+            </a:r>
+          </a:p>
+          <a:p>
+            <a:r>
+              <a:rPr lang="en-US" dirty="0" smtClean="0">
+                <a:solidFill>
+                  <a:schemeClr val="bg1"/>
+                </a:solidFill>
+              </a:rPr>
+              <a:t>Tuning the number of reducers</a:t>
+            </a:r>
+          </a:p>
+          <a:p>
+            <a:endParaRPr lang="en-US" dirty="0">
+              <a:solidFill>
+                <a:schemeClr val="bg1"/>
+              </a:solidFill>
+            </a:endParaRPr>
+          </a:p>
+          <a:p>
+            <a:endParaRPr lang="en-US" dirty="0">
+              <a:solidFill>
+                <a:schemeClr val="bg1"/>
+              </a:solidFill>
+            </a:endParaRPr>
+          </a:p>
+          <a:p>
+            <a:endParaRPr lang="en-US" dirty="0">
+              <a:solidFill>
+                <a:schemeClr val="bg1"/>
+              </a:solidFill>
+            </a:endParaRPr>
+          </a:p>
         </p:txBody>
       </p:sp>
     </p:spTree>
     <p:extLst>
       <p:ext uri="{BB962C8B-B14F-4D97-AF65-F5344CB8AC3E}">
-        <p14:creationId xmlns:p14="http://schemas.microsoft.com/office/powerpoint/2010/main" val="610321729"/>
+        <p14:creationId xmlns:p14="http://schemas.microsoft.com/office/powerpoint/2010/main" val="3151929899"/>
       </p:ext>
     </p:extLst>
   </p:cSld>
   <p:clrMapOvr>
     <a:masterClrMapping/>
   </p:clrMapOvr>
+  <p:timing>
+    <p:tnLst>
+      <p:par>
+        <p:cTn id="1" dur="indefinite" restart="never" nodeType="tmRoot"/>
+      </p:par>
+    </p:tnLst>
+  </p:timing>
 </p:sld>
 </file>
 
@@ -10084,7 +11427,7 @@
                   <a:schemeClr val="bg1"/>
                 </a:solidFill>
               </a:rPr>
-              <a:t>Appendix</a:t>
+              <a:t>Summary</a:t>
             </a:r>
           </a:p>
         </p:txBody>
@@ -10105,72 +11448,73 @@
           <a:lstStyle/>
           <a:p>
             <a:r>
-              <a:rPr lang="en-US" dirty="0" err="1">
+              <a:rPr lang="en-US" dirty="0" smtClean="0">
                 <a:solidFill>
                   <a:schemeClr val="bg1"/>
                 </a:solidFill>
               </a:rPr>
-              <a:t>Github</a:t>
-            </a:r>
+              <a:t>Tables </a:t>
+            </a:r>
+          </a:p>
+          <a:p>
+            <a:pPr lvl="1"/>
             <a:r>
               <a:rPr lang="en-US" dirty="0">
                 <a:solidFill>
                   <a:schemeClr val="bg1"/>
                 </a:solidFill>
               </a:rPr>
-              <a:t> URL: </a:t>
-            </a:r>
-            <a:r>
-              <a:rPr lang="en-US" dirty="0">
-                <a:solidFill>
-                  <a:schemeClr val="bg1"/>
-                </a:solidFill>
-                <a:hlinkClick r:id="rId2"/>
-              </a:rPr>
-              <a:t>https://github.com/dhiviyadhanasekar/Events_Recommender</a:t>
-            </a:r>
-            <a:r>
-              <a:rPr lang="en-US" dirty="0">
+              <a:t>original </a:t>
+            </a:r>
+            <a:r>
+              <a:rPr lang="en-US" dirty="0" smtClean="0">
                 <a:solidFill>
                   <a:schemeClr val="bg1"/>
                 </a:solidFill>
               </a:rPr>
-              <a:t> </a:t>
-            </a:r>
-          </a:p>
-          <a:p>
-            <a:endParaRPr lang="en-US" dirty="0">
+              <a:t>csv</a:t>
+            </a:r>
+          </a:p>
+          <a:p>
+            <a:pPr lvl="1"/>
+            <a:r>
+              <a:rPr lang="en-US" dirty="0" smtClean="0">
+                <a:solidFill>
+                  <a:schemeClr val="bg1"/>
+                </a:solidFill>
+              </a:rPr>
+              <a:t>Transformed table</a:t>
+            </a:r>
+          </a:p>
+          <a:p>
+            <a:pPr lvl="1"/>
+            <a:r>
+              <a:rPr lang="en-US" dirty="0" smtClean="0">
+                <a:solidFill>
+                  <a:schemeClr val="bg1"/>
+                </a:solidFill>
+              </a:rPr>
+              <a:t>Cosine similarity</a:t>
+            </a:r>
+          </a:p>
+          <a:p>
+            <a:pPr lvl="1"/>
+            <a:r>
+              <a:rPr lang="en-US" dirty="0" smtClean="0">
+                <a:solidFill>
+                  <a:schemeClr val="bg1"/>
+                </a:solidFill>
+              </a:rPr>
+              <a:t>result</a:t>
+            </a:r>
+          </a:p>
+          <a:p>
+            <a:pPr lvl="1"/>
+            <a:endParaRPr lang="en-US" dirty="0" smtClean="0">
               <a:solidFill>
                 <a:schemeClr val="bg1"/>
               </a:solidFill>
             </a:endParaRPr>
-          </a:p>
-          <a:p>
-            <a:r>
-              <a:rPr lang="en-US" dirty="0">
-                <a:solidFill>
-                  <a:schemeClr val="bg1"/>
-                </a:solidFill>
-              </a:rPr>
-              <a:t>Dataset: </a:t>
-            </a:r>
-            <a:r>
-              <a:rPr lang="en-US" dirty="0">
-                <a:solidFill>
-                  <a:schemeClr val="bg1"/>
-                </a:solidFill>
-                <a:hlinkClick r:id="rId3"/>
-              </a:rPr>
-              <a:t>https://www.kaggle.com/c/event-recommendation-engine-challenge/data</a:t>
-            </a:r>
-            <a:r>
-              <a:rPr lang="en-US" dirty="0">
-                <a:solidFill>
-                  <a:schemeClr val="bg1"/>
-                </a:solidFill>
-              </a:rPr>
-              <a:t> </a:t>
-            </a:r>
           </a:p>
           <a:p>
             <a:pPr lvl="1"/>
@@ -10181,7 +11525,13 @@
             </a:endParaRPr>
           </a:p>
           <a:p>
-            <a:pPr lvl="1"/>
+            <a:endParaRPr lang="en-US" dirty="0" smtClean="0">
+              <a:solidFill>
+                <a:schemeClr val="bg1"/>
+              </a:solidFill>
+            </a:endParaRPr>
+          </a:p>
+          <a:p>
             <a:endParaRPr lang="en-US" dirty="0">
               <a:solidFill>
                 <a:schemeClr val="bg1"/>
@@ -10193,13 +11543,20 @@
     </p:spTree>
     <p:extLst>
       <p:ext uri="{BB962C8B-B14F-4D97-AF65-F5344CB8AC3E}">
-        <p14:creationId xmlns:p14="http://schemas.microsoft.com/office/powerpoint/2010/main" val="1700977332"/>
+        <p14:creationId xmlns:p14="http://schemas.microsoft.com/office/powerpoint/2010/main" val="610321729"/>
       </p:ext>
     </p:extLst>
   </p:cSld>
   <p:clrMapOvr>
     <a:masterClrMapping/>
   </p:clrMapOvr>
+  <p:timing>
+    <p:tnLst>
+      <p:par>
+        <p:cTn id="1" dur="indefinite" restart="never" nodeType="tmRoot"/>
+      </p:par>
+    </p:tnLst>
+  </p:timing>
 </p:sld>
 </file>
 
@@ -10496,4 +11853,265 @@
     </a:ext>
   </a:extLst>
 </a:theme>
+</file>
+
+<file path=ppt/theme/theme2.xml><?xml version="1.0" encoding="utf-8"?>
+<a:theme xmlns:a="http://schemas.openxmlformats.org/drawingml/2006/main" name="Office Theme">
+  <a:themeElements>
+    <a:clrScheme name="Office">
+      <a:dk1>
+        <a:sysClr val="windowText" lastClr="000000"/>
+      </a:dk1>
+      <a:lt1>
+        <a:sysClr val="window" lastClr="FFFFFF"/>
+      </a:lt1>
+      <a:dk2>
+        <a:srgbClr val="44546A"/>
+      </a:dk2>
+      <a:lt2>
+        <a:srgbClr val="E7E6E6"/>
+      </a:lt2>
+      <a:accent1>
+        <a:srgbClr val="5B9BD5"/>
+      </a:accent1>
+      <a:accent2>
+        <a:srgbClr val="ED7D31"/>
+      </a:accent2>
+      <a:accent3>
+        <a:srgbClr val="A5A5A5"/>
+      </a:accent3>
+      <a:accent4>
+        <a:srgbClr val="FFC000"/>
+      </a:accent4>
+      <a:accent5>
+        <a:srgbClr val="4472C4"/>
+      </a:accent5>
+      <a:accent6>
+        <a:srgbClr val="70AD47"/>
+      </a:accent6>
+      <a:hlink>
+        <a:srgbClr val="0563C1"/>
+      </a:hlink>
+      <a:folHlink>
+        <a:srgbClr val="954F72"/>
+      </a:folHlink>
+    </a:clrScheme>
+    <a:fontScheme name="Office">
+      <a:majorFont>
+        <a:latin typeface="Calibri Light" panose="020F0302020204030204"/>
+        <a:ea typeface=""/>
+        <a:cs typeface=""/>
+        <a:font script="Jpan" typeface="Yu Gothic Light"/>
+        <a:font script="Hang" typeface="맑은 고딕"/>
+        <a:font script="Hans" typeface="DengXian Light"/>
+        <a:font script="Hant" typeface="新細明體"/>
+        <a:font script="Arab" typeface="Times New Roman"/>
+        <a:font script="Hebr" typeface="Times New Roman"/>
+        <a:font script="Thai" typeface="Angsana New"/>
+        <a:font script="Ethi" typeface="Nyala"/>
+        <a:font script="Beng" typeface="Vrinda"/>
+        <a:font script="Gujr" typeface="Shruti"/>
+        <a:font script="Khmr" typeface="MoolBoran"/>
+        <a:font script="Knda" typeface="Tunga"/>
+        <a:font script="Guru" typeface="Raavi"/>
+        <a:font script="Cans" typeface="Euphemia"/>
+        <a:font script="Cher" typeface="Plantagenet Cherokee"/>
+        <a:font script="Yiii" typeface="Microsoft Yi Baiti"/>
+        <a:font script="Tibt" typeface="Microsoft Himalaya"/>
+        <a:font script="Thaa" typeface="MV Boli"/>
+        <a:font script="Deva" typeface="Mangal"/>
+        <a:font script="Telu" typeface="Gautami"/>
+        <a:font script="Taml" typeface="Latha"/>
+        <a:font script="Syrc" typeface="Estrangelo Edessa"/>
+        <a:font script="Orya" typeface="Kalinga"/>
+        <a:font script="Mlym" typeface="Kartika"/>
+        <a:font script="Laoo" typeface="DokChampa"/>
+        <a:font script="Sinh" typeface="Iskoola Pota"/>
+        <a:font script="Mong" typeface="Mongolian Baiti"/>
+        <a:font script="Viet" typeface="Times New Roman"/>
+        <a:font script="Uigh" typeface="Microsoft Uighur"/>
+        <a:font script="Geor" typeface="Sylfaen"/>
+      </a:majorFont>
+      <a:minorFont>
+        <a:latin typeface="Calibri" panose="020F0502020204030204"/>
+        <a:ea typeface=""/>
+        <a:cs typeface=""/>
+        <a:font script="Jpan" typeface="Yu Gothic"/>
+        <a:font script="Hang" typeface="맑은 고딕"/>
+        <a:font script="Hans" typeface="DengXian"/>
+        <a:font script="Hant" typeface="新細明體"/>
+        <a:font script="Arab" typeface="Arial"/>
+        <a:font script="Hebr" typeface="Arial"/>
+        <a:font script="Thai" typeface="Cordia New"/>
+        <a:font script="Ethi" typeface="Nyala"/>
+        <a:font script="Beng" typeface="Vrinda"/>
+        <a:font script="Gujr" typeface="Shruti"/>
+        <a:font script="Khmr" typeface="DaunPenh"/>
+        <a:font script="Knda" typeface="Tunga"/>
+        <a:font script="Guru" typeface="Raavi"/>
+        <a:font script="Cans" typeface="Euphemia"/>
+        <a:font script="Cher" typeface="Plantagenet Cherokee"/>
+        <a:font script="Yiii" typeface="Microsoft Yi Baiti"/>
+        <a:font script="Tibt" typeface="Microsoft Himalaya"/>
+        <a:font script="Thaa" typeface="MV Boli"/>
+        <a:font script="Deva" typeface="Mangal"/>
+        <a:font script="Telu" typeface="Gautami"/>
+        <a:font script="Taml" typeface="Latha"/>
+        <a:font script="Syrc" typeface="Estrangelo Edessa"/>
+        <a:font script="Orya" typeface="Kalinga"/>
+        <a:font script="Mlym" typeface="Kartika"/>
+        <a:font script="Laoo" typeface="DokChampa"/>
+        <a:font script="Sinh" typeface="Iskoola Pota"/>
+        <a:font script="Mong" typeface="Mongolian Baiti"/>
+        <a:font script="Viet" typeface="Arial"/>
+        <a:font script="Uigh" typeface="Microsoft Uighur"/>
+        <a:font script="Geor" typeface="Sylfaen"/>
+      </a:minorFont>
+    </a:fontScheme>
+    <a:fmtScheme name="Office">
+      <a:fillStyleLst>
+        <a:solidFill>
+          <a:schemeClr val="phClr"/>
+        </a:solidFill>
+        <a:gradFill rotWithShape="1">
+          <a:gsLst>
+            <a:gs pos="0">
+              <a:schemeClr val="phClr">
+                <a:lumMod val="110000"/>
+                <a:satMod val="105000"/>
+                <a:tint val="67000"/>
+              </a:schemeClr>
+            </a:gs>
+            <a:gs pos="50000">
+              <a:schemeClr val="phClr">
+                <a:lumMod val="105000"/>
+                <a:satMod val="103000"/>
+                <a:tint val="73000"/>
+              </a:schemeClr>
+            </a:gs>
+            <a:gs pos="100000">
+              <a:schemeClr val="phClr">
+                <a:lumMod val="105000"/>
+                <a:satMod val="109000"/>
+                <a:tint val="81000"/>
+              </a:schemeClr>
+            </a:gs>
+          </a:gsLst>
+          <a:lin ang="5400000" scaled="0"/>
+        </a:gradFill>
+        <a:gradFill rotWithShape="1">
+          <a:gsLst>
+            <a:gs pos="0">
+              <a:schemeClr val="phClr">
+                <a:satMod val="103000"/>
+                <a:lumMod val="102000"/>
+                <a:tint val="94000"/>
+              </a:schemeClr>
+            </a:gs>
+            <a:gs pos="50000">
+              <a:schemeClr val="phClr">
+                <a:satMod val="110000"/>
+                <a:lumMod val="100000"/>
+                <a:shade val="100000"/>
+              </a:schemeClr>
+            </a:gs>
+            <a:gs pos="100000">
+              <a:schemeClr val="phClr">
+                <a:lumMod val="99000"/>
+                <a:satMod val="120000"/>
+                <a:shade val="78000"/>
+              </a:schemeClr>
+            </a:gs>
+          </a:gsLst>
+          <a:lin ang="5400000" scaled="0"/>
+        </a:gradFill>
+      </a:fillStyleLst>
+      <a:lnStyleLst>
+        <a:ln w="6350" cap="flat" cmpd="sng" algn="ctr">
+          <a:solidFill>
+            <a:schemeClr val="phClr"/>
+          </a:solidFill>
+          <a:prstDash val="solid"/>
+          <a:miter lim="800000"/>
+        </a:ln>
+        <a:ln w="12700" cap="flat" cmpd="sng" algn="ctr">
+          <a:solidFill>
+            <a:schemeClr val="phClr"/>
+          </a:solidFill>
+          <a:prstDash val="solid"/>
+          <a:miter lim="800000"/>
+        </a:ln>
+        <a:ln w="19050" cap="flat" cmpd="sng" algn="ctr">
+          <a:solidFill>
+            <a:schemeClr val="phClr"/>
+          </a:solidFill>
+          <a:prstDash val="solid"/>
+          <a:miter lim="800000"/>
+        </a:ln>
+      </a:lnStyleLst>
+      <a:effectStyleLst>
+        <a:effectStyle>
+          <a:effectLst/>
+        </a:effectStyle>
+        <a:effectStyle>
+          <a:effectLst/>
+        </a:effectStyle>
+        <a:effectStyle>
+          <a:effectLst>
+            <a:outerShdw blurRad="57150" dist="19050" dir="5400000" algn="ctr" rotWithShape="0">
+              <a:srgbClr val="000000">
+                <a:alpha val="63000"/>
+              </a:srgbClr>
+            </a:outerShdw>
+          </a:effectLst>
+        </a:effectStyle>
+      </a:effectStyleLst>
+      <a:bgFillStyleLst>
+        <a:solidFill>
+          <a:schemeClr val="phClr"/>
+        </a:solidFill>
+        <a:solidFill>
+          <a:schemeClr val="phClr">
+            <a:tint val="95000"/>
+            <a:satMod val="170000"/>
+          </a:schemeClr>
+        </a:solidFill>
+        <a:gradFill rotWithShape="1">
+          <a:gsLst>
+            <a:gs pos="0">
+              <a:schemeClr val="phClr">
+                <a:tint val="93000"/>
+                <a:satMod val="150000"/>
+                <a:shade val="98000"/>
+                <a:lumMod val="102000"/>
+              </a:schemeClr>
+            </a:gs>
+            <a:gs pos="50000">
+              <a:schemeClr val="phClr">
+                <a:tint val="98000"/>
+                <a:satMod val="130000"/>
+                <a:shade val="90000"/>
+                <a:lumMod val="103000"/>
+              </a:schemeClr>
+            </a:gs>
+            <a:gs pos="100000">
+              <a:schemeClr val="phClr">
+                <a:shade val="63000"/>
+                <a:satMod val="120000"/>
+              </a:schemeClr>
+            </a:gs>
+          </a:gsLst>
+          <a:lin ang="5400000" scaled="0"/>
+        </a:gradFill>
+      </a:bgFillStyleLst>
+    </a:fmtScheme>
+  </a:themeElements>
+  <a:objectDefaults/>
+  <a:extraClrSchemeLst/>
+  <a:extLst>
+    <a:ext uri="{05A4C25C-085E-4340-85A3-A5531E510DB2}">
+      <thm15:themeFamily xmlns:thm15="http://schemas.microsoft.com/office/thememl/2012/main" name="Office Theme" id="{62F939B6-93AF-4DB8-9C6B-D6C7DFDC589F}" vid="{4A3C46E8-61CC-4603-A589-7422A47A8E4A}"/>
+    </a:ext>
+  </a:extLst>
+</a:theme>
 </file>
</xml_diff>